<commit_message>
fix redo/undo button update
</commit_message>
<xml_diff>
--- a/resources/icon.pptx
+++ b/resources/icon.pptx
@@ -8208,174 +8208,50 @@
       </p:grpSp>
       <p:grpSp>
         <p:nvGrpSpPr>
-          <p:cNvPr id="149" name="群組 148"/>
+          <p:cNvPr id="5" name="群組 4"/>
           <p:cNvGrpSpPr/>
           <p:nvPr/>
         </p:nvGrpSpPr>
         <p:grpSpPr>
           <a:xfrm>
-            <a:off x="2852210" y="1142981"/>
-            <a:ext cx="4800194" cy="4372490"/>
-            <a:chOff x="2740598" y="511996"/>
-            <a:chExt cx="4800194" cy="4372490"/>
+            <a:off x="0" y="0"/>
+            <a:ext cx="4792132" cy="4356484"/>
+            <a:chOff x="0" y="0"/>
+            <a:chExt cx="4792132" cy="4356484"/>
           </a:xfrm>
         </p:grpSpPr>
-        <p:sp>
-          <p:nvSpPr>
-            <p:cNvPr id="164" name="圓角矩形 163"/>
-            <p:cNvSpPr/>
-            <p:nvPr/>
-          </p:nvSpPr>
-          <p:spPr>
-            <a:xfrm>
-              <a:off x="2744028" y="512676"/>
-              <a:ext cx="4792132" cy="4356484"/>
-            </a:xfrm>
-            <a:prstGeom prst="roundRect">
-              <a:avLst>
-                <a:gd name="adj" fmla="val 0"/>
-              </a:avLst>
-            </a:prstGeom>
-            <a:solidFill>
-              <a:srgbClr val="60AEFC"/>
-            </a:solidFill>
-            <a:ln>
-              <a:noFill/>
-            </a:ln>
-          </p:spPr>
-          <p:style>
-            <a:lnRef idx="2">
-              <a:schemeClr val="accent1">
-                <a:shade val="50000"/>
-              </a:schemeClr>
-            </a:lnRef>
-            <a:fillRef idx="1">
-              <a:schemeClr val="accent1"/>
-            </a:fillRef>
-            <a:effectRef idx="0">
-              <a:schemeClr val="accent1"/>
-            </a:effectRef>
-            <a:fontRef idx="minor">
-              <a:schemeClr val="lt1"/>
-            </a:fontRef>
-          </p:style>
-          <p:txBody>
-            <a:bodyPr rtlCol="0" anchor="ctr"/>
-            <a:lstStyle/>
-            <a:p>
-              <a:pPr algn="ctr"/>
-              <a:endParaRPr lang="zh-TW" altLang="en-US"/>
-            </a:p>
-          </p:txBody>
-        </p:sp>
-        <p:cxnSp>
-          <p:nvCxnSpPr>
-            <p:cNvPr id="165" name="直線接點 164"/>
-            <p:cNvCxnSpPr>
-              <a:stCxn id="164" idx="1"/>
-              <a:endCxn id="164" idx="3"/>
-            </p:cNvCxnSpPr>
-            <p:nvPr/>
-          </p:nvCxnSpPr>
-          <p:spPr>
-            <a:xfrm>
-              <a:off x="3663660" y="2690918"/>
-              <a:ext cx="3024385" cy="0"/>
-            </a:xfrm>
-            <a:prstGeom prst="line">
-              <a:avLst/>
-            </a:prstGeom>
-            <a:ln w="127000">
-              <a:solidFill>
-                <a:schemeClr val="bg1"/>
-              </a:solidFill>
-            </a:ln>
-          </p:spPr>
-          <p:style>
-            <a:lnRef idx="1">
-              <a:schemeClr val="accent1"/>
-            </a:lnRef>
-            <a:fillRef idx="0">
-              <a:schemeClr val="accent1"/>
-            </a:fillRef>
-            <a:effectRef idx="0">
-              <a:schemeClr val="accent1"/>
-            </a:effectRef>
-            <a:fontRef idx="minor">
-              <a:schemeClr val="tx1"/>
-            </a:fontRef>
-          </p:style>
-        </p:cxnSp>
-        <p:cxnSp>
-          <p:nvCxnSpPr>
-            <p:cNvPr id="166" name="直線接點 165"/>
-            <p:cNvCxnSpPr>
-              <a:stCxn id="164" idx="0"/>
-              <a:endCxn id="164" idx="2"/>
-            </p:cNvCxnSpPr>
-            <p:nvPr/>
-          </p:nvCxnSpPr>
-          <p:spPr>
-            <a:xfrm>
-              <a:off x="5140094" y="1338401"/>
-              <a:ext cx="0" cy="2705034"/>
-            </a:xfrm>
-            <a:prstGeom prst="line">
-              <a:avLst/>
-            </a:prstGeom>
-            <a:ln w="127000">
-              <a:solidFill>
-                <a:schemeClr val="bg1"/>
-              </a:solidFill>
-            </a:ln>
-          </p:spPr>
-          <p:style>
-            <a:lnRef idx="1">
-              <a:schemeClr val="accent1"/>
-            </a:lnRef>
-            <a:fillRef idx="0">
-              <a:schemeClr val="accent1"/>
-            </a:fillRef>
-            <a:effectRef idx="0">
-              <a:schemeClr val="accent1"/>
-            </a:effectRef>
-            <a:fontRef idx="minor">
-              <a:schemeClr val="tx1"/>
-            </a:fontRef>
-          </p:style>
-        </p:cxnSp>
         <p:grpSp>
           <p:nvGrpSpPr>
-            <p:cNvPr id="167" name="群組 166"/>
+            <p:cNvPr id="4" name="群組 3"/>
             <p:cNvGrpSpPr/>
             <p:nvPr/>
           </p:nvGrpSpPr>
           <p:grpSpPr>
             <a:xfrm>
-              <a:off x="3004818" y="1390414"/>
-              <a:ext cx="4355780" cy="2394571"/>
-              <a:chOff x="-4705200" y="983936"/>
-              <a:chExt cx="4355780" cy="2394571"/>
+              <a:off x="0" y="0"/>
+              <a:ext cx="4792132" cy="4356484"/>
+              <a:chOff x="0" y="0"/>
+              <a:chExt cx="4792132" cy="4356484"/>
             </a:xfrm>
           </p:grpSpPr>
           <p:sp>
             <p:nvSpPr>
-              <p:cNvPr id="219" name="橢圓 218"/>
-              <p:cNvSpPr>
-                <a:spLocks noChangeAspect="1"/>
-              </p:cNvSpPr>
+              <p:cNvPr id="164" name="圓角矩形 163"/>
+              <p:cNvSpPr/>
               <p:nvPr/>
             </p:nvSpPr>
             <p:spPr>
               <a:xfrm>
-                <a:off x="-2786384" y="2076590"/>
-                <a:ext cx="432000" cy="432000"/>
+                <a:off x="0" y="0"/>
+                <a:ext cx="4792132" cy="4356484"/>
               </a:xfrm>
-              <a:prstGeom prst="ellipse">
-                <a:avLst/>
+              <a:prstGeom prst="roundRect">
+                <a:avLst>
+                  <a:gd name="adj" fmla="val 0"/>
+                </a:avLst>
               </a:prstGeom>
               <a:solidFill>
-                <a:srgbClr val="FF0000"/>
+                <a:srgbClr val="60AEFC"/>
               </a:solidFill>
               <a:ln>
                 <a:noFill/>
@@ -8408,594 +8284,16 @@
           </p:sp>
           <p:sp>
             <p:nvSpPr>
-              <p:cNvPr id="222" name="橢圓 221"/>
-              <p:cNvSpPr>
-                <a:spLocks noChangeAspect="1"/>
-              </p:cNvSpPr>
+              <p:cNvPr id="131" name="矩形 130"/>
+              <p:cNvSpPr/>
               <p:nvPr/>
             </p:nvSpPr>
             <p:spPr>
-              <a:xfrm>
-                <a:off x="-3338318" y="2701377"/>
-                <a:ext cx="396000" cy="396000"/>
+              <a:xfrm rot="10800000">
+                <a:off x="0" y="0"/>
+                <a:ext cx="1388112" cy="271077"/>
               </a:xfrm>
-              <a:prstGeom prst="ellipse">
-                <a:avLst/>
-              </a:prstGeom>
-              <a:solidFill>
-                <a:srgbClr val="FF9F00"/>
-              </a:solidFill>
-              <a:ln>
-                <a:noFill/>
-              </a:ln>
-            </p:spPr>
-            <p:style>
-              <a:lnRef idx="2">
-                <a:schemeClr val="accent1">
-                  <a:shade val="50000"/>
-                </a:schemeClr>
-              </a:lnRef>
-              <a:fillRef idx="1">
-                <a:schemeClr val="accent1"/>
-              </a:fillRef>
-              <a:effectRef idx="0">
-                <a:schemeClr val="accent1"/>
-              </a:effectRef>
-              <a:fontRef idx="minor">
-                <a:schemeClr val="lt1"/>
-              </a:fontRef>
-            </p:style>
-            <p:txBody>
-              <a:bodyPr rtlCol="0" anchor="ctr"/>
-              <a:lstStyle/>
-              <a:p>
-                <a:pPr algn="ctr"/>
-                <a:endParaRPr lang="zh-TW" altLang="en-US"/>
-              </a:p>
-            </p:txBody>
-          </p:sp>
-          <p:sp>
-            <p:nvSpPr>
-              <p:cNvPr id="225" name="橢圓 224"/>
-              <p:cNvSpPr>
-                <a:spLocks noChangeAspect="1"/>
-              </p:cNvSpPr>
-              <p:nvPr/>
-            </p:nvSpPr>
-            <p:spPr>
-              <a:xfrm>
-                <a:off x="-3608530" y="2969089"/>
-                <a:ext cx="360000" cy="360000"/>
-              </a:xfrm>
-              <a:prstGeom prst="ellipse">
-                <a:avLst/>
-              </a:prstGeom>
-              <a:solidFill>
-                <a:srgbClr val="FFC600"/>
-              </a:solidFill>
-              <a:ln>
-                <a:noFill/>
-              </a:ln>
-            </p:spPr>
-            <p:style>
-              <a:lnRef idx="2">
-                <a:schemeClr val="accent1">
-                  <a:shade val="50000"/>
-                </a:schemeClr>
-              </a:lnRef>
-              <a:fillRef idx="1">
-                <a:schemeClr val="accent1"/>
-              </a:fillRef>
-              <a:effectRef idx="0">
-                <a:schemeClr val="accent1"/>
-              </a:effectRef>
-              <a:fontRef idx="minor">
-                <a:schemeClr val="lt1"/>
-              </a:fontRef>
-            </p:style>
-            <p:txBody>
-              <a:bodyPr rtlCol="0" anchor="ctr"/>
-              <a:lstStyle/>
-              <a:p>
-                <a:pPr algn="ctr"/>
-                <a:endParaRPr lang="zh-TW" altLang="en-US"/>
-              </a:p>
-            </p:txBody>
-          </p:sp>
-          <p:sp>
-            <p:nvSpPr>
-              <p:cNvPr id="228" name="橢圓 227"/>
-              <p:cNvSpPr>
-                <a:spLocks noChangeAspect="1"/>
-              </p:cNvSpPr>
-              <p:nvPr/>
-            </p:nvSpPr>
-            <p:spPr>
-              <a:xfrm>
-                <a:off x="-3990334" y="3017923"/>
-                <a:ext cx="324000" cy="324000"/>
-              </a:xfrm>
-              <a:prstGeom prst="ellipse">
-                <a:avLst/>
-              </a:prstGeom>
-              <a:solidFill>
-                <a:srgbClr val="FFFA00"/>
-              </a:solidFill>
-              <a:ln>
-                <a:noFill/>
-              </a:ln>
-            </p:spPr>
-            <p:style>
-              <a:lnRef idx="2">
-                <a:schemeClr val="accent1">
-                  <a:shade val="50000"/>
-                </a:schemeClr>
-              </a:lnRef>
-              <a:fillRef idx="1">
-                <a:schemeClr val="accent1"/>
-              </a:fillRef>
-              <a:effectRef idx="0">
-                <a:schemeClr val="accent1"/>
-              </a:effectRef>
-              <a:fontRef idx="minor">
-                <a:schemeClr val="lt1"/>
-              </a:fontRef>
-            </p:style>
-            <p:txBody>
-              <a:bodyPr rtlCol="0" anchor="ctr"/>
-              <a:lstStyle/>
-              <a:p>
-                <a:pPr algn="ctr"/>
-                <a:endParaRPr lang="zh-TW" altLang="en-US"/>
-              </a:p>
-            </p:txBody>
-          </p:sp>
-          <p:sp>
-            <p:nvSpPr>
-              <p:cNvPr id="229" name="橢圓 228"/>
-              <p:cNvSpPr>
-                <a:spLocks noChangeAspect="1"/>
-              </p:cNvSpPr>
-              <p:nvPr/>
-            </p:nvSpPr>
-            <p:spPr>
-              <a:xfrm>
-                <a:off x="-4305625" y="2885667"/>
-                <a:ext cx="288000" cy="288000"/>
-              </a:xfrm>
-              <a:prstGeom prst="ellipse">
-                <a:avLst/>
-              </a:prstGeom>
-              <a:solidFill>
-                <a:srgbClr val="D8FF00"/>
-              </a:solidFill>
-              <a:ln>
-                <a:noFill/>
-              </a:ln>
-            </p:spPr>
-            <p:style>
-              <a:lnRef idx="2">
-                <a:schemeClr val="accent1">
-                  <a:shade val="50000"/>
-                </a:schemeClr>
-              </a:lnRef>
-              <a:fillRef idx="1">
-                <a:schemeClr val="accent1"/>
-              </a:fillRef>
-              <a:effectRef idx="0">
-                <a:schemeClr val="accent1"/>
-              </a:effectRef>
-              <a:fontRef idx="minor">
-                <a:schemeClr val="lt1"/>
-              </a:fontRef>
-            </p:style>
-            <p:txBody>
-              <a:bodyPr rtlCol="0" anchor="ctr"/>
-              <a:lstStyle/>
-              <a:p>
-                <a:pPr algn="ctr"/>
-                <a:endParaRPr lang="zh-TW" altLang="en-US"/>
-              </a:p>
-            </p:txBody>
-          </p:sp>
-          <p:sp>
-            <p:nvSpPr>
-              <p:cNvPr id="230" name="橢圓 229"/>
-              <p:cNvSpPr>
-                <a:spLocks noChangeAspect="1"/>
-              </p:cNvSpPr>
-              <p:nvPr/>
-            </p:nvSpPr>
-            <p:spPr>
-              <a:xfrm>
-                <a:off x="-4505237" y="2663954"/>
-                <a:ext cx="252000" cy="252000"/>
-              </a:xfrm>
-              <a:prstGeom prst="ellipse">
-                <a:avLst/>
-              </a:prstGeom>
-              <a:solidFill>
-                <a:srgbClr val="70FF00"/>
-              </a:solidFill>
-              <a:ln>
-                <a:noFill/>
-              </a:ln>
-            </p:spPr>
-            <p:style>
-              <a:lnRef idx="2">
-                <a:schemeClr val="accent1">
-                  <a:shade val="50000"/>
-                </a:schemeClr>
-              </a:lnRef>
-              <a:fillRef idx="1">
-                <a:schemeClr val="accent1"/>
-              </a:fillRef>
-              <a:effectRef idx="0">
-                <a:schemeClr val="accent1"/>
-              </a:effectRef>
-              <a:fontRef idx="minor">
-                <a:schemeClr val="lt1"/>
-              </a:fontRef>
-            </p:style>
-            <p:txBody>
-              <a:bodyPr rtlCol="0" anchor="ctr"/>
-              <a:lstStyle/>
-              <a:p>
-                <a:pPr algn="ctr"/>
-                <a:endParaRPr lang="zh-TW" altLang="en-US"/>
-              </a:p>
-            </p:txBody>
-          </p:sp>
-          <p:sp>
-            <p:nvSpPr>
-              <p:cNvPr id="232" name="橢圓 231"/>
-              <p:cNvSpPr>
-                <a:spLocks noChangeAspect="1"/>
-              </p:cNvSpPr>
-              <p:nvPr/>
-            </p:nvSpPr>
-            <p:spPr>
-              <a:xfrm>
-                <a:off x="-4651633" y="2448523"/>
-                <a:ext cx="216000" cy="216000"/>
-              </a:xfrm>
-              <a:prstGeom prst="ellipse">
-                <a:avLst/>
-              </a:prstGeom>
-              <a:solidFill>
-                <a:srgbClr val="09FF00"/>
-              </a:solidFill>
-              <a:ln>
-                <a:noFill/>
-              </a:ln>
-            </p:spPr>
-            <p:style>
-              <a:lnRef idx="2">
-                <a:schemeClr val="accent1">
-                  <a:shade val="50000"/>
-                </a:schemeClr>
-              </a:lnRef>
-              <a:fillRef idx="1">
-                <a:schemeClr val="accent1"/>
-              </a:fillRef>
-              <a:effectRef idx="0">
-                <a:schemeClr val="accent1"/>
-              </a:effectRef>
-              <a:fontRef idx="minor">
-                <a:schemeClr val="lt1"/>
-              </a:fontRef>
-            </p:style>
-            <p:txBody>
-              <a:bodyPr rtlCol="0" anchor="ctr"/>
-              <a:lstStyle/>
-              <a:p>
-                <a:pPr algn="ctr"/>
-                <a:endParaRPr lang="zh-TW" altLang="en-US"/>
-              </a:p>
-            </p:txBody>
-          </p:sp>
-          <p:sp>
-            <p:nvSpPr>
-              <p:cNvPr id="233" name="橢圓 232"/>
-              <p:cNvSpPr>
-                <a:spLocks noChangeAspect="1"/>
-              </p:cNvSpPr>
-              <p:nvPr/>
-            </p:nvSpPr>
-            <p:spPr>
-              <a:xfrm>
-                <a:off x="-4705200" y="2216560"/>
-                <a:ext cx="144000" cy="144000"/>
-              </a:xfrm>
-              <a:prstGeom prst="ellipse">
-                <a:avLst/>
-              </a:prstGeom>
-              <a:solidFill>
-                <a:srgbClr val="00FFFF"/>
-              </a:solidFill>
-              <a:ln>
-                <a:noFill/>
-              </a:ln>
-            </p:spPr>
-            <p:style>
-              <a:lnRef idx="2">
-                <a:schemeClr val="accent1">
-                  <a:shade val="50000"/>
-                </a:schemeClr>
-              </a:lnRef>
-              <a:fillRef idx="1">
-                <a:schemeClr val="accent1"/>
-              </a:fillRef>
-              <a:effectRef idx="0">
-                <a:schemeClr val="accent1"/>
-              </a:effectRef>
-              <a:fontRef idx="minor">
-                <a:schemeClr val="lt1"/>
-              </a:fontRef>
-            </p:style>
-            <p:txBody>
-              <a:bodyPr rtlCol="0" anchor="ctr"/>
-              <a:lstStyle/>
-              <a:p>
-                <a:pPr algn="ctr"/>
-                <a:endParaRPr lang="zh-TW" altLang="en-US"/>
-              </a:p>
-            </p:txBody>
-          </p:sp>
-          <p:sp>
-            <p:nvSpPr>
-              <p:cNvPr id="234" name="橢圓 233"/>
-              <p:cNvSpPr>
-                <a:spLocks noChangeAspect="1"/>
-              </p:cNvSpPr>
-              <p:nvPr/>
-            </p:nvSpPr>
-            <p:spPr>
-              <a:xfrm>
-                <a:off x="-3075358" y="2385767"/>
-                <a:ext cx="414000" cy="414000"/>
-              </a:xfrm>
-              <a:prstGeom prst="ellipse">
-                <a:avLst/>
-              </a:prstGeom>
-              <a:solidFill>
-                <a:srgbClr val="FF5400"/>
-              </a:solidFill>
-              <a:ln>
-                <a:noFill/>
-              </a:ln>
-            </p:spPr>
-            <p:style>
-              <a:lnRef idx="2">
-                <a:schemeClr val="accent1">
-                  <a:shade val="50000"/>
-                </a:schemeClr>
-              </a:lnRef>
-              <a:fillRef idx="1">
-                <a:schemeClr val="accent1"/>
-              </a:fillRef>
-              <a:effectRef idx="0">
-                <a:schemeClr val="accent1"/>
-              </a:effectRef>
-              <a:fontRef idx="minor">
-                <a:schemeClr val="lt1"/>
-              </a:fontRef>
-            </p:style>
-            <p:txBody>
-              <a:bodyPr rtlCol="0" anchor="ctr"/>
-              <a:lstStyle/>
-              <a:p>
-                <a:pPr algn="ctr"/>
-                <a:endParaRPr lang="zh-TW" altLang="en-US"/>
-              </a:p>
-            </p:txBody>
-          </p:sp>
-          <p:sp>
-            <p:nvSpPr>
-              <p:cNvPr id="235" name="橢圓 234"/>
-              <p:cNvSpPr>
-                <a:spLocks noChangeAspect="1"/>
-              </p:cNvSpPr>
-              <p:nvPr/>
-            </p:nvSpPr>
-            <p:spPr>
-              <a:xfrm flipV="1">
-                <a:off x="-3920058" y="1002272"/>
-                <a:ext cx="396000" cy="396000"/>
-              </a:xfrm>
-              <a:prstGeom prst="ellipse">
-                <a:avLst/>
-              </a:prstGeom>
-              <a:solidFill>
-                <a:schemeClr val="bg1"/>
-              </a:solidFill>
-              <a:ln>
-                <a:noFill/>
-              </a:ln>
-            </p:spPr>
-            <p:style>
-              <a:lnRef idx="2">
-                <a:schemeClr val="accent1">
-                  <a:shade val="50000"/>
-                </a:schemeClr>
-              </a:lnRef>
-              <a:fillRef idx="1">
-                <a:schemeClr val="accent1"/>
-              </a:fillRef>
-              <a:effectRef idx="0">
-                <a:schemeClr val="accent1"/>
-              </a:effectRef>
-              <a:fontRef idx="minor">
-                <a:schemeClr val="lt1"/>
-              </a:fontRef>
-            </p:style>
-            <p:txBody>
-              <a:bodyPr rtlCol="0" anchor="ctr"/>
-              <a:lstStyle/>
-              <a:p>
-                <a:pPr algn="ctr"/>
-                <a:endParaRPr lang="zh-TW" altLang="en-US" u="sng"/>
-              </a:p>
-            </p:txBody>
-          </p:sp>
-          <p:sp>
-            <p:nvSpPr>
-              <p:cNvPr id="236" name="橢圓 235"/>
-              <p:cNvSpPr>
-                <a:spLocks noChangeAspect="1"/>
-              </p:cNvSpPr>
-              <p:nvPr/>
-            </p:nvSpPr>
-            <p:spPr>
-              <a:xfrm flipV="1">
-                <a:off x="-4238942" y="1109345"/>
-                <a:ext cx="324000" cy="324000"/>
-              </a:xfrm>
-              <a:prstGeom prst="ellipse">
-                <a:avLst/>
-              </a:prstGeom>
-              <a:solidFill>
-                <a:schemeClr val="bg1"/>
-              </a:solidFill>
-              <a:ln>
-                <a:noFill/>
-              </a:ln>
-            </p:spPr>
-            <p:style>
-              <a:lnRef idx="2">
-                <a:schemeClr val="accent1">
-                  <a:shade val="50000"/>
-                </a:schemeClr>
-              </a:lnRef>
-              <a:fillRef idx="1">
-                <a:schemeClr val="accent1"/>
-              </a:fillRef>
-              <a:effectRef idx="0">
-                <a:schemeClr val="accent1"/>
-              </a:effectRef>
-              <a:fontRef idx="minor">
-                <a:schemeClr val="lt1"/>
-              </a:fontRef>
-            </p:style>
-            <p:txBody>
-              <a:bodyPr rtlCol="0" anchor="ctr"/>
-              <a:lstStyle/>
-              <a:p>
-                <a:pPr algn="ctr"/>
-                <a:endParaRPr lang="zh-TW" altLang="en-US" u="sng"/>
-              </a:p>
-            </p:txBody>
-          </p:sp>
-          <p:sp>
-            <p:nvSpPr>
-              <p:cNvPr id="237" name="橢圓 236"/>
-              <p:cNvSpPr>
-                <a:spLocks noChangeAspect="1"/>
-              </p:cNvSpPr>
-              <p:nvPr/>
-            </p:nvSpPr>
-            <p:spPr>
-              <a:xfrm flipV="1">
-                <a:off x="-4474214" y="1341662"/>
-                <a:ext cx="288000" cy="288000"/>
-              </a:xfrm>
-              <a:prstGeom prst="ellipse">
-                <a:avLst/>
-              </a:prstGeom>
-              <a:solidFill>
-                <a:schemeClr val="bg1"/>
-              </a:solidFill>
-              <a:ln>
-                <a:noFill/>
-              </a:ln>
-            </p:spPr>
-            <p:style>
-              <a:lnRef idx="2">
-                <a:schemeClr val="accent1">
-                  <a:shade val="50000"/>
-                </a:schemeClr>
-              </a:lnRef>
-              <a:fillRef idx="1">
-                <a:schemeClr val="accent1"/>
-              </a:fillRef>
-              <a:effectRef idx="0">
-                <a:schemeClr val="accent1"/>
-              </a:effectRef>
-              <a:fontRef idx="minor">
-                <a:schemeClr val="lt1"/>
-              </a:fontRef>
-            </p:style>
-            <p:txBody>
-              <a:bodyPr rtlCol="0" anchor="ctr"/>
-              <a:lstStyle/>
-              <a:p>
-                <a:pPr algn="ctr"/>
-                <a:endParaRPr lang="zh-TW" altLang="en-US" u="sng"/>
-              </a:p>
-            </p:txBody>
-          </p:sp>
-          <p:sp>
-            <p:nvSpPr>
-              <p:cNvPr id="238" name="橢圓 237"/>
-              <p:cNvSpPr>
-                <a:spLocks noChangeAspect="1"/>
-              </p:cNvSpPr>
-              <p:nvPr/>
-            </p:nvSpPr>
-            <p:spPr>
-              <a:xfrm flipV="1">
-                <a:off x="-4629106" y="1618372"/>
-                <a:ext cx="252000" cy="252000"/>
-              </a:xfrm>
-              <a:prstGeom prst="ellipse">
-                <a:avLst/>
-              </a:prstGeom>
-              <a:solidFill>
-                <a:schemeClr val="bg1"/>
-              </a:solidFill>
-              <a:ln>
-                <a:noFill/>
-              </a:ln>
-            </p:spPr>
-            <p:style>
-              <a:lnRef idx="2">
-                <a:schemeClr val="accent1">
-                  <a:shade val="50000"/>
-                </a:schemeClr>
-              </a:lnRef>
-              <a:fillRef idx="1">
-                <a:schemeClr val="accent1"/>
-              </a:fillRef>
-              <a:effectRef idx="0">
-                <a:schemeClr val="accent1"/>
-              </a:effectRef>
-              <a:fontRef idx="minor">
-                <a:schemeClr val="lt1"/>
-              </a:fontRef>
-            </p:style>
-            <p:txBody>
-              <a:bodyPr rtlCol="0" anchor="ctr"/>
-              <a:lstStyle/>
-              <a:p>
-                <a:pPr algn="ctr"/>
-                <a:endParaRPr lang="zh-TW" altLang="en-US" u="sng"/>
-              </a:p>
-            </p:txBody>
-          </p:sp>
-          <p:sp>
-            <p:nvSpPr>
-              <p:cNvPr id="239" name="橢圓 238"/>
-              <p:cNvSpPr>
-                <a:spLocks noChangeAspect="1"/>
-              </p:cNvSpPr>
-              <p:nvPr/>
-            </p:nvSpPr>
-            <p:spPr>
-              <a:xfrm>
-                <a:off x="-4703237" y="1915159"/>
-                <a:ext cx="216000" cy="216000"/>
-              </a:xfrm>
-              <a:prstGeom prst="ellipse">
+              <a:prstGeom prst="rect">
                 <a:avLst/>
               </a:prstGeom>
               <a:solidFill>
@@ -9032,18 +8330,16 @@
           </p:sp>
           <p:sp>
             <p:nvSpPr>
-              <p:cNvPr id="240" name="橢圓 239"/>
-              <p:cNvSpPr>
-                <a:spLocks noChangeAspect="1"/>
-              </p:cNvSpPr>
+              <p:cNvPr id="132" name="矩形 131"/>
+              <p:cNvSpPr/>
               <p:nvPr/>
             </p:nvSpPr>
             <p:spPr>
               <a:xfrm>
-                <a:off x="-3525166" y="1120889"/>
-                <a:ext cx="324000" cy="324000"/>
+                <a:off x="0" y="0"/>
+                <a:ext cx="270000" cy="1389600"/>
               </a:xfrm>
-              <a:prstGeom prst="ellipse">
+              <a:prstGeom prst="rect">
                 <a:avLst/>
               </a:prstGeom>
               <a:solidFill>
@@ -9080,18 +8376,16 @@
           </p:sp>
           <p:sp>
             <p:nvSpPr>
-              <p:cNvPr id="241" name="橢圓 240"/>
-              <p:cNvSpPr>
-                <a:spLocks noChangeAspect="1"/>
-              </p:cNvSpPr>
+              <p:cNvPr id="138" name="矩形 137"/>
+              <p:cNvSpPr/>
               <p:nvPr/>
             </p:nvSpPr>
             <p:spPr>
               <a:xfrm>
-                <a:off x="-3229390" y="1329997"/>
-                <a:ext cx="288000" cy="288000"/>
+                <a:off x="3404020" y="0"/>
+                <a:ext cx="1388112" cy="271077"/>
               </a:xfrm>
-              <a:prstGeom prst="ellipse">
+              <a:prstGeom prst="rect">
                 <a:avLst/>
               </a:prstGeom>
               <a:solidFill>
@@ -9128,18 +8422,16 @@
           </p:sp>
           <p:sp>
             <p:nvSpPr>
-              <p:cNvPr id="242" name="橢圓 241"/>
-              <p:cNvSpPr>
-                <a:spLocks noChangeAspect="1"/>
-              </p:cNvSpPr>
+              <p:cNvPr id="8" name="矩形 7"/>
+              <p:cNvSpPr/>
               <p:nvPr/>
             </p:nvSpPr>
             <p:spPr>
               <a:xfrm>
-                <a:off x="-3012647" y="1620568"/>
-                <a:ext cx="252000" cy="252000"/>
+                <a:off x="3404020" y="4085407"/>
+                <a:ext cx="1388112" cy="271077"/>
               </a:xfrm>
-              <a:prstGeom prst="ellipse">
+              <a:prstGeom prst="rect">
                 <a:avLst/>
               </a:prstGeom>
               <a:solidFill>
@@ -9176,18 +8468,16 @@
           </p:sp>
           <p:sp>
             <p:nvSpPr>
-              <p:cNvPr id="243" name="橢圓 242"/>
-              <p:cNvSpPr>
-                <a:spLocks noChangeAspect="1"/>
-              </p:cNvSpPr>
+              <p:cNvPr id="371" name="矩形 370"/>
+              <p:cNvSpPr/>
               <p:nvPr/>
             </p:nvSpPr>
             <p:spPr>
-              <a:xfrm>
-                <a:off x="-2838688" y="1908138"/>
-                <a:ext cx="180000" cy="180000"/>
+              <a:xfrm rot="5400000">
+                <a:off x="3962537" y="3526889"/>
+                <a:ext cx="1388112" cy="271077"/>
               </a:xfrm>
-              <a:prstGeom prst="ellipse">
+              <a:prstGeom prst="rect">
                 <a:avLst/>
               </a:prstGeom>
               <a:solidFill>
@@ -9224,210 +8514,16 @@
           </p:sp>
           <p:sp>
             <p:nvSpPr>
-              <p:cNvPr id="244" name="橢圓 243"/>
-              <p:cNvSpPr>
-                <a:spLocks noChangeAspect="1"/>
-              </p:cNvSpPr>
+              <p:cNvPr id="135" name="矩形 134"/>
+              <p:cNvSpPr/>
               <p:nvPr/>
             </p:nvSpPr>
             <p:spPr>
-              <a:xfrm flipV="1">
-                <a:off x="-1535570" y="2982507"/>
-                <a:ext cx="396000" cy="396000"/>
+              <a:xfrm rot="10800000">
+                <a:off x="0" y="4085407"/>
+                <a:ext cx="1388112" cy="271077"/>
               </a:xfrm>
-              <a:prstGeom prst="ellipse">
-                <a:avLst/>
-              </a:prstGeom>
-              <a:solidFill>
-                <a:schemeClr val="bg1"/>
-              </a:solidFill>
-              <a:ln>
-                <a:noFill/>
-              </a:ln>
-            </p:spPr>
-            <p:style>
-              <a:lnRef idx="2">
-                <a:schemeClr val="accent1">
-                  <a:shade val="50000"/>
-                </a:schemeClr>
-              </a:lnRef>
-              <a:fillRef idx="1">
-                <a:schemeClr val="accent1"/>
-              </a:fillRef>
-              <a:effectRef idx="0">
-                <a:schemeClr val="accent1"/>
-              </a:effectRef>
-              <a:fontRef idx="minor">
-                <a:schemeClr val="lt1"/>
-              </a:fontRef>
-            </p:style>
-            <p:txBody>
-              <a:bodyPr rtlCol="0" anchor="ctr"/>
-              <a:lstStyle/>
-              <a:p>
-                <a:pPr algn="ctr"/>
-                <a:endParaRPr lang="zh-TW" altLang="en-US" u="sng"/>
-              </a:p>
-            </p:txBody>
-          </p:sp>
-          <p:sp>
-            <p:nvSpPr>
-              <p:cNvPr id="245" name="橢圓 244"/>
-              <p:cNvSpPr>
-                <a:spLocks noChangeAspect="1"/>
-              </p:cNvSpPr>
-              <p:nvPr/>
-            </p:nvSpPr>
-            <p:spPr>
-              <a:xfrm flipV="1">
-                <a:off x="-1144686" y="2947434"/>
-                <a:ext cx="324000" cy="324000"/>
-              </a:xfrm>
-              <a:prstGeom prst="ellipse">
-                <a:avLst/>
-              </a:prstGeom>
-              <a:solidFill>
-                <a:schemeClr val="bg1"/>
-              </a:solidFill>
-              <a:ln>
-                <a:noFill/>
-              </a:ln>
-            </p:spPr>
-            <p:style>
-              <a:lnRef idx="2">
-                <a:schemeClr val="accent1">
-                  <a:shade val="50000"/>
-                </a:schemeClr>
-              </a:lnRef>
-              <a:fillRef idx="1">
-                <a:schemeClr val="accent1"/>
-              </a:fillRef>
-              <a:effectRef idx="0">
-                <a:schemeClr val="accent1"/>
-              </a:effectRef>
-              <a:fontRef idx="minor">
-                <a:schemeClr val="lt1"/>
-              </a:fontRef>
-            </p:style>
-            <p:txBody>
-              <a:bodyPr rtlCol="0" anchor="ctr"/>
-              <a:lstStyle/>
-              <a:p>
-                <a:pPr algn="ctr"/>
-                <a:endParaRPr lang="zh-TW" altLang="en-US" u="sng"/>
-              </a:p>
-            </p:txBody>
-          </p:sp>
-          <p:sp>
-            <p:nvSpPr>
-              <p:cNvPr id="246" name="橢圓 245"/>
-              <p:cNvSpPr>
-                <a:spLocks noChangeAspect="1"/>
-              </p:cNvSpPr>
-              <p:nvPr/>
-            </p:nvSpPr>
-            <p:spPr>
-              <a:xfrm flipV="1">
-                <a:off x="-858814" y="2829339"/>
-                <a:ext cx="288000" cy="288000"/>
-              </a:xfrm>
-              <a:prstGeom prst="ellipse">
-                <a:avLst/>
-              </a:prstGeom>
-              <a:solidFill>
-                <a:schemeClr val="bg1"/>
-              </a:solidFill>
-              <a:ln>
-                <a:noFill/>
-              </a:ln>
-            </p:spPr>
-            <p:style>
-              <a:lnRef idx="2">
-                <a:schemeClr val="accent1">
-                  <a:shade val="50000"/>
-                </a:schemeClr>
-              </a:lnRef>
-              <a:fillRef idx="1">
-                <a:schemeClr val="accent1"/>
-              </a:fillRef>
-              <a:effectRef idx="0">
-                <a:schemeClr val="accent1"/>
-              </a:effectRef>
-              <a:fontRef idx="minor">
-                <a:schemeClr val="lt1"/>
-              </a:fontRef>
-            </p:style>
-            <p:txBody>
-              <a:bodyPr rtlCol="0" anchor="ctr"/>
-              <a:lstStyle/>
-              <a:p>
-                <a:pPr algn="ctr"/>
-                <a:endParaRPr lang="zh-TW" altLang="en-US" u="sng"/>
-              </a:p>
-            </p:txBody>
-          </p:sp>
-          <p:sp>
-            <p:nvSpPr>
-              <p:cNvPr id="247" name="橢圓 246"/>
-              <p:cNvSpPr>
-                <a:spLocks noChangeAspect="1"/>
-              </p:cNvSpPr>
-              <p:nvPr/>
-            </p:nvSpPr>
-            <p:spPr>
-              <a:xfrm flipV="1">
-                <a:off x="-664386" y="2598350"/>
-                <a:ext cx="252000" cy="252000"/>
-              </a:xfrm>
-              <a:prstGeom prst="ellipse">
-                <a:avLst/>
-              </a:prstGeom>
-              <a:solidFill>
-                <a:schemeClr val="bg1"/>
-              </a:solidFill>
-              <a:ln>
-                <a:noFill/>
-              </a:ln>
-            </p:spPr>
-            <p:style>
-              <a:lnRef idx="2">
-                <a:schemeClr val="accent1">
-                  <a:shade val="50000"/>
-                </a:schemeClr>
-              </a:lnRef>
-              <a:fillRef idx="1">
-                <a:schemeClr val="accent1"/>
-              </a:fillRef>
-              <a:effectRef idx="0">
-                <a:schemeClr val="accent1"/>
-              </a:effectRef>
-              <a:fontRef idx="minor">
-                <a:schemeClr val="lt1"/>
-              </a:fontRef>
-            </p:style>
-            <p:txBody>
-              <a:bodyPr rtlCol="0" anchor="ctr"/>
-              <a:lstStyle/>
-              <a:p>
-                <a:pPr algn="ctr"/>
-                <a:endParaRPr lang="zh-TW" altLang="en-US" u="sng"/>
-              </a:p>
-            </p:txBody>
-          </p:sp>
-          <p:sp>
-            <p:nvSpPr>
-              <p:cNvPr id="248" name="橢圓 247"/>
-              <p:cNvSpPr>
-                <a:spLocks noChangeAspect="1"/>
-              </p:cNvSpPr>
-              <p:nvPr/>
-            </p:nvSpPr>
-            <p:spPr>
-              <a:xfrm>
-                <a:off x="-1862367" y="2983799"/>
-                <a:ext cx="324000" cy="324000"/>
-              </a:xfrm>
-              <a:prstGeom prst="ellipse">
+              <a:prstGeom prst="rect">
                 <a:avLst/>
               </a:prstGeom>
               <a:solidFill>
@@ -9464,18 +8560,16 @@
           </p:sp>
           <p:sp>
             <p:nvSpPr>
-              <p:cNvPr id="249" name="橢圓 248"/>
-              <p:cNvSpPr>
-                <a:spLocks noChangeAspect="1"/>
-              </p:cNvSpPr>
+              <p:cNvPr id="137" name="矩形 136"/>
+              <p:cNvSpPr/>
               <p:nvPr/>
             </p:nvSpPr>
             <p:spPr>
-              <a:xfrm>
-                <a:off x="-2158699" y="2807669"/>
-                <a:ext cx="288000" cy="288000"/>
+              <a:xfrm rot="16200000">
+                <a:off x="3962537" y="558517"/>
+                <a:ext cx="1388112" cy="271077"/>
               </a:xfrm>
-              <a:prstGeom prst="ellipse">
+              <a:prstGeom prst="rect">
                 <a:avLst/>
               </a:prstGeom>
               <a:solidFill>
@@ -9512,18 +8606,16 @@
           </p:sp>
           <p:sp>
             <p:nvSpPr>
-              <p:cNvPr id="250" name="橢圓 249"/>
-              <p:cNvSpPr>
-                <a:spLocks noChangeAspect="1"/>
-              </p:cNvSpPr>
+              <p:cNvPr id="140" name="矩形 139"/>
+              <p:cNvSpPr/>
               <p:nvPr/>
             </p:nvSpPr>
             <p:spPr>
               <a:xfrm>
-                <a:off x="-2346591" y="2651627"/>
-                <a:ext cx="216000" cy="216000"/>
+                <a:off x="0" y="2966884"/>
+                <a:ext cx="270000" cy="1389600"/>
               </a:xfrm>
-              <a:prstGeom prst="ellipse">
+              <a:prstGeom prst="rect">
                 <a:avLst/>
               </a:prstGeom>
               <a:solidFill>
@@ -9558,863 +8650,1883 @@
               </a:p>
             </p:txBody>
           </p:sp>
-          <p:sp>
-            <p:nvSpPr>
-              <p:cNvPr id="251" name="橢圓 250"/>
-              <p:cNvSpPr>
-                <a:spLocks noChangeAspect="1"/>
-              </p:cNvSpPr>
+        </p:grpSp>
+        <p:grpSp>
+          <p:nvGrpSpPr>
+            <p:cNvPr id="372" name="群組 371"/>
+            <p:cNvGrpSpPr/>
+            <p:nvPr/>
+          </p:nvGrpSpPr>
+          <p:grpSpPr>
+            <a:xfrm>
+              <a:off x="218176" y="825725"/>
+              <a:ext cx="4355780" cy="2705034"/>
+              <a:chOff x="3116683" y="1970066"/>
+              <a:chExt cx="4355780" cy="2705034"/>
+            </a:xfrm>
+          </p:grpSpPr>
+          <p:cxnSp>
+            <p:nvCxnSpPr>
+              <p:cNvPr id="373" name="直線接點 372"/>
+              <p:cNvCxnSpPr/>
               <p:nvPr/>
-            </p:nvSpPr>
+            </p:nvCxnSpPr>
             <p:spPr>
               <a:xfrm>
-                <a:off x="-2257116" y="1447116"/>
-                <a:ext cx="396000" cy="396000"/>
+                <a:off x="3775525" y="3322583"/>
+                <a:ext cx="3024385" cy="0"/>
               </a:xfrm>
-              <a:prstGeom prst="ellipse">
+              <a:prstGeom prst="line">
                 <a:avLst/>
               </a:prstGeom>
-              <a:solidFill>
-                <a:srgbClr val="FF00A8"/>
-              </a:solidFill>
-              <a:ln>
-                <a:noFill/>
+              <a:ln w="127000">
+                <a:solidFill>
+                  <a:schemeClr val="bg1"/>
+                </a:solidFill>
               </a:ln>
             </p:spPr>
             <p:style>
-              <a:lnRef idx="2">
-                <a:schemeClr val="accent1">
-                  <a:shade val="50000"/>
-                </a:schemeClr>
+              <a:lnRef idx="1">
+                <a:schemeClr val="accent1"/>
               </a:lnRef>
-              <a:fillRef idx="1">
+              <a:fillRef idx="0">
                 <a:schemeClr val="accent1"/>
               </a:fillRef>
               <a:effectRef idx="0">
                 <a:schemeClr val="accent1"/>
               </a:effectRef>
               <a:fontRef idx="minor">
-                <a:schemeClr val="lt1"/>
+                <a:schemeClr val="tx1"/>
               </a:fontRef>
             </p:style>
-            <p:txBody>
-              <a:bodyPr rtlCol="0" anchor="ctr"/>
-              <a:lstStyle/>
-              <a:p>
-                <a:pPr algn="ctr"/>
-                <a:endParaRPr lang="zh-TW" altLang="en-US"/>
-              </a:p>
-            </p:txBody>
-          </p:sp>
-          <p:sp>
-            <p:nvSpPr>
-              <p:cNvPr id="252" name="橢圓 251"/>
-              <p:cNvSpPr>
-                <a:spLocks noChangeAspect="1"/>
-              </p:cNvSpPr>
+          </p:cxnSp>
+          <p:cxnSp>
+            <p:nvCxnSpPr>
+              <p:cNvPr id="374" name="直線接點 373"/>
+              <p:cNvCxnSpPr/>
               <p:nvPr/>
-            </p:nvSpPr>
+            </p:nvCxnSpPr>
             <p:spPr>
               <a:xfrm>
-                <a:off x="-1999578" y="1168294"/>
-                <a:ext cx="360000" cy="360000"/>
+                <a:off x="5251959" y="1970066"/>
+                <a:ext cx="0" cy="2705034"/>
               </a:xfrm>
-              <a:prstGeom prst="ellipse">
+              <a:prstGeom prst="line">
                 <a:avLst/>
               </a:prstGeom>
-              <a:solidFill>
-                <a:srgbClr val="FF00E7"/>
-              </a:solidFill>
-              <a:ln>
-                <a:noFill/>
+              <a:ln w="127000">
+                <a:solidFill>
+                  <a:schemeClr val="bg1"/>
+                </a:solidFill>
               </a:ln>
             </p:spPr>
             <p:style>
-              <a:lnRef idx="2">
-                <a:schemeClr val="accent1">
-                  <a:shade val="50000"/>
-                </a:schemeClr>
+              <a:lnRef idx="1">
+                <a:schemeClr val="accent1"/>
               </a:lnRef>
-              <a:fillRef idx="1">
+              <a:fillRef idx="0">
                 <a:schemeClr val="accent1"/>
               </a:fillRef>
               <a:effectRef idx="0">
                 <a:schemeClr val="accent1"/>
               </a:effectRef>
               <a:fontRef idx="minor">
-                <a:schemeClr val="lt1"/>
+                <a:schemeClr val="tx1"/>
               </a:fontRef>
             </p:style>
-            <p:txBody>
-              <a:bodyPr rtlCol="0" anchor="ctr"/>
-              <a:lstStyle/>
-              <a:p>
-                <a:pPr algn="ctr"/>
-                <a:endParaRPr lang="zh-TW" altLang="en-US"/>
-              </a:p>
-            </p:txBody>
-          </p:sp>
-          <p:sp>
-            <p:nvSpPr>
-              <p:cNvPr id="253" name="橢圓 252"/>
-              <p:cNvSpPr>
-                <a:spLocks noChangeAspect="1"/>
-              </p:cNvSpPr>
+          </p:cxnSp>
+          <p:grpSp>
+            <p:nvGrpSpPr>
+              <p:cNvPr id="375" name="群組 374"/>
+              <p:cNvGrpSpPr/>
               <p:nvPr/>
-            </p:nvSpPr>
-            <p:spPr>
+            </p:nvGrpSpPr>
+            <p:grpSpPr>
               <a:xfrm>
-                <a:off x="-1629286" y="983936"/>
-                <a:ext cx="324000" cy="324000"/>
+                <a:off x="3116683" y="2022079"/>
+                <a:ext cx="4355780" cy="2394571"/>
+                <a:chOff x="-4705200" y="983936"/>
+                <a:chExt cx="4355780" cy="2394571"/>
               </a:xfrm>
-              <a:prstGeom prst="ellipse">
-                <a:avLst/>
-              </a:prstGeom>
-              <a:solidFill>
-                <a:srgbClr val="ED00FF"/>
-              </a:solidFill>
-              <a:ln>
-                <a:noFill/>
-              </a:ln>
-            </p:spPr>
-            <p:style>
-              <a:lnRef idx="2">
-                <a:schemeClr val="accent1">
-                  <a:shade val="50000"/>
-                </a:schemeClr>
-              </a:lnRef>
-              <a:fillRef idx="1">
-                <a:schemeClr val="accent1"/>
-              </a:fillRef>
-              <a:effectRef idx="0">
-                <a:schemeClr val="accent1"/>
-              </a:effectRef>
-              <a:fontRef idx="minor">
-                <a:schemeClr val="lt1"/>
-              </a:fontRef>
-            </p:style>
-            <p:txBody>
-              <a:bodyPr rtlCol="0" anchor="ctr"/>
-              <a:lstStyle/>
-              <a:p>
-                <a:pPr algn="ctr"/>
-                <a:endParaRPr lang="zh-TW" altLang="en-US"/>
-              </a:p>
-            </p:txBody>
-          </p:sp>
-          <p:sp>
-            <p:nvSpPr>
-              <p:cNvPr id="254" name="橢圓 253"/>
-              <p:cNvSpPr>
-                <a:spLocks noChangeAspect="1"/>
-              </p:cNvSpPr>
-              <p:nvPr/>
-            </p:nvSpPr>
-            <p:spPr>
-              <a:xfrm>
-                <a:off x="-1229161" y="1044377"/>
-                <a:ext cx="288000" cy="288000"/>
-              </a:xfrm>
-              <a:prstGeom prst="ellipse">
-                <a:avLst/>
-              </a:prstGeom>
-              <a:solidFill>
-                <a:srgbClr val="D100FF"/>
-              </a:solidFill>
-              <a:ln>
-                <a:noFill/>
-              </a:ln>
-            </p:spPr>
-            <p:style>
-              <a:lnRef idx="2">
-                <a:schemeClr val="accent1">
-                  <a:shade val="50000"/>
-                </a:schemeClr>
-              </a:lnRef>
-              <a:fillRef idx="1">
-                <a:schemeClr val="accent1"/>
-              </a:fillRef>
-              <a:effectRef idx="0">
-                <a:schemeClr val="accent1"/>
-              </a:effectRef>
-              <a:fontRef idx="minor">
-                <a:schemeClr val="lt1"/>
-              </a:fontRef>
-            </p:style>
-            <p:txBody>
-              <a:bodyPr rtlCol="0" anchor="ctr"/>
-              <a:lstStyle/>
-              <a:p>
-                <a:pPr algn="ctr"/>
-                <a:endParaRPr lang="zh-TW" altLang="en-US"/>
-              </a:p>
-            </p:txBody>
-          </p:sp>
-          <p:sp>
-            <p:nvSpPr>
-              <p:cNvPr id="255" name="橢圓 254"/>
-              <p:cNvSpPr>
-                <a:spLocks noChangeAspect="1"/>
-              </p:cNvSpPr>
-              <p:nvPr/>
-            </p:nvSpPr>
-            <p:spPr>
-              <a:xfrm>
-                <a:off x="-907671" y="1303853"/>
-                <a:ext cx="252000" cy="252000"/>
-              </a:xfrm>
-              <a:prstGeom prst="ellipse">
-                <a:avLst/>
-              </a:prstGeom>
-              <a:solidFill>
-                <a:srgbClr val="A700FF"/>
-              </a:solidFill>
-              <a:ln>
-                <a:noFill/>
-              </a:ln>
-            </p:spPr>
-            <p:style>
-              <a:lnRef idx="2">
-                <a:schemeClr val="accent1">
-                  <a:shade val="50000"/>
-                </a:schemeClr>
-              </a:lnRef>
-              <a:fillRef idx="1">
-                <a:schemeClr val="accent1"/>
-              </a:fillRef>
-              <a:effectRef idx="0">
-                <a:schemeClr val="accent1"/>
-              </a:effectRef>
-              <a:fontRef idx="minor">
-                <a:schemeClr val="lt1"/>
-              </a:fontRef>
-            </p:style>
-            <p:txBody>
-              <a:bodyPr rtlCol="0" anchor="ctr"/>
-              <a:lstStyle/>
-              <a:p>
-                <a:pPr algn="ctr"/>
-                <a:endParaRPr lang="zh-TW" altLang="en-US"/>
-              </a:p>
-            </p:txBody>
-          </p:sp>
-          <p:sp>
-            <p:nvSpPr>
-              <p:cNvPr id="256" name="橢圓 255"/>
-              <p:cNvSpPr>
-                <a:spLocks noChangeAspect="1"/>
-              </p:cNvSpPr>
-              <p:nvPr/>
-            </p:nvSpPr>
-            <p:spPr>
-              <a:xfrm>
-                <a:off x="-700874" y="1546983"/>
-                <a:ext cx="216000" cy="216000"/>
-              </a:xfrm>
-              <a:prstGeom prst="ellipse">
-                <a:avLst/>
-              </a:prstGeom>
-              <a:solidFill>
-                <a:srgbClr val="5D00FF"/>
-              </a:solidFill>
-              <a:ln>
-                <a:noFill/>
-              </a:ln>
-            </p:spPr>
-            <p:style>
-              <a:lnRef idx="2">
-                <a:schemeClr val="accent1">
-                  <a:shade val="50000"/>
-                </a:schemeClr>
-              </a:lnRef>
-              <a:fillRef idx="1">
-                <a:schemeClr val="accent1"/>
-              </a:fillRef>
-              <a:effectRef idx="0">
-                <a:schemeClr val="accent1"/>
-              </a:effectRef>
-              <a:fontRef idx="minor">
-                <a:schemeClr val="lt1"/>
-              </a:fontRef>
-            </p:style>
-            <p:txBody>
-              <a:bodyPr rtlCol="0" anchor="ctr"/>
-              <a:lstStyle/>
-              <a:p>
-                <a:pPr algn="ctr"/>
-                <a:endParaRPr lang="zh-TW" altLang="en-US"/>
-              </a:p>
-            </p:txBody>
-          </p:sp>
-          <p:sp>
-            <p:nvSpPr>
-              <p:cNvPr id="257" name="橢圓 256"/>
-              <p:cNvSpPr>
-                <a:spLocks noChangeAspect="1"/>
-              </p:cNvSpPr>
-              <p:nvPr/>
-            </p:nvSpPr>
-            <p:spPr>
-              <a:xfrm>
-                <a:off x="-557313" y="1794773"/>
-                <a:ext cx="180000" cy="180000"/>
-              </a:xfrm>
-              <a:prstGeom prst="ellipse">
-                <a:avLst/>
-              </a:prstGeom>
-              <a:solidFill>
-                <a:srgbClr val="1B00FF"/>
-              </a:solidFill>
-              <a:ln>
-                <a:noFill/>
-              </a:ln>
-            </p:spPr>
-            <p:style>
-              <a:lnRef idx="2">
-                <a:schemeClr val="accent1">
-                  <a:shade val="50000"/>
-                </a:schemeClr>
-              </a:lnRef>
-              <a:fillRef idx="1">
-                <a:schemeClr val="accent1"/>
-              </a:fillRef>
-              <a:effectRef idx="0">
-                <a:schemeClr val="accent1"/>
-              </a:effectRef>
-              <a:fontRef idx="minor">
-                <a:schemeClr val="lt1"/>
-              </a:fontRef>
-            </p:style>
-            <p:txBody>
-              <a:bodyPr rtlCol="0" anchor="ctr"/>
-              <a:lstStyle/>
-              <a:p>
-                <a:pPr algn="ctr"/>
-                <a:endParaRPr lang="zh-TW" altLang="en-US"/>
-              </a:p>
-            </p:txBody>
-          </p:sp>
-          <p:sp>
-            <p:nvSpPr>
-              <p:cNvPr id="258" name="橢圓 257"/>
-              <p:cNvSpPr>
-                <a:spLocks noChangeAspect="1"/>
-              </p:cNvSpPr>
-              <p:nvPr/>
-            </p:nvSpPr>
-            <p:spPr>
-              <a:xfrm>
-                <a:off x="-2491616" y="1775282"/>
-                <a:ext cx="414000" cy="414000"/>
-              </a:xfrm>
-              <a:prstGeom prst="ellipse">
-                <a:avLst/>
-              </a:prstGeom>
-              <a:solidFill>
-                <a:srgbClr val="FF0069"/>
-              </a:solidFill>
-              <a:ln>
-                <a:noFill/>
-              </a:ln>
-            </p:spPr>
-            <p:style>
-              <a:lnRef idx="2">
-                <a:schemeClr val="accent1">
-                  <a:shade val="50000"/>
-                </a:schemeClr>
-              </a:lnRef>
-              <a:fillRef idx="1">
-                <a:schemeClr val="accent1"/>
-              </a:fillRef>
-              <a:effectRef idx="0">
-                <a:schemeClr val="accent1"/>
-              </a:effectRef>
-              <a:fontRef idx="minor">
-                <a:schemeClr val="lt1"/>
-              </a:fontRef>
-            </p:style>
-            <p:txBody>
-              <a:bodyPr rtlCol="0" anchor="ctr"/>
-              <a:lstStyle/>
-              <a:p>
-                <a:pPr algn="ctr"/>
-                <a:endParaRPr lang="zh-TW" altLang="en-US"/>
-              </a:p>
-            </p:txBody>
-          </p:sp>
-          <p:sp>
-            <p:nvSpPr>
-              <p:cNvPr id="259" name="橢圓 258"/>
-              <p:cNvSpPr>
-                <a:spLocks noChangeAspect="1"/>
-              </p:cNvSpPr>
-              <p:nvPr/>
-            </p:nvSpPr>
-            <p:spPr>
-              <a:xfrm>
-                <a:off x="-493420" y="2219093"/>
-                <a:ext cx="144000" cy="144000"/>
-              </a:xfrm>
-              <a:prstGeom prst="ellipse">
-                <a:avLst/>
-              </a:prstGeom>
-              <a:solidFill>
-                <a:srgbClr val="00FFFE"/>
-              </a:solidFill>
-              <a:ln>
-                <a:noFill/>
-              </a:ln>
-            </p:spPr>
-            <p:style>
-              <a:lnRef idx="2">
-                <a:schemeClr val="accent1">
-                  <a:shade val="50000"/>
-                </a:schemeClr>
-              </a:lnRef>
-              <a:fillRef idx="1">
-                <a:schemeClr val="accent1"/>
-              </a:fillRef>
-              <a:effectRef idx="0">
-                <a:schemeClr val="accent1"/>
-              </a:effectRef>
-              <a:fontRef idx="minor">
-                <a:schemeClr val="lt1"/>
-              </a:fontRef>
-            </p:style>
-            <p:txBody>
-              <a:bodyPr rtlCol="0" anchor="ctr"/>
-              <a:lstStyle/>
-              <a:p>
-                <a:pPr algn="ctr"/>
-                <a:endParaRPr lang="zh-TW" altLang="en-US"/>
-              </a:p>
-            </p:txBody>
-          </p:sp>
-          <p:sp>
-            <p:nvSpPr>
-              <p:cNvPr id="260" name="橢圓 259"/>
-              <p:cNvSpPr>
-                <a:spLocks noChangeAspect="1"/>
-              </p:cNvSpPr>
-              <p:nvPr/>
-            </p:nvSpPr>
-            <p:spPr>
-              <a:xfrm>
-                <a:off x="-2476729" y="2503628"/>
-                <a:ext cx="144000" cy="144000"/>
-              </a:xfrm>
-              <a:prstGeom prst="ellipse">
-                <a:avLst/>
-              </a:prstGeom>
-              <a:solidFill>
-                <a:schemeClr val="bg1"/>
-              </a:solidFill>
-              <a:ln>
-                <a:noFill/>
-              </a:ln>
-            </p:spPr>
-            <p:style>
-              <a:lnRef idx="2">
-                <a:schemeClr val="accent1">
-                  <a:shade val="50000"/>
-                </a:schemeClr>
-              </a:lnRef>
-              <a:fillRef idx="1">
-                <a:schemeClr val="accent1"/>
-              </a:fillRef>
-              <a:effectRef idx="0">
-                <a:schemeClr val="accent1"/>
-              </a:effectRef>
-              <a:fontRef idx="minor">
-                <a:schemeClr val="lt1"/>
-              </a:fontRef>
-            </p:style>
-            <p:txBody>
-              <a:bodyPr rtlCol="0" anchor="ctr"/>
-              <a:lstStyle/>
-              <a:p>
-                <a:pPr algn="ctr"/>
-                <a:endParaRPr lang="zh-TW" altLang="en-US"/>
-              </a:p>
-            </p:txBody>
-          </p:sp>
-          <p:sp>
-            <p:nvSpPr>
-              <p:cNvPr id="261" name="橢圓 260"/>
-              <p:cNvSpPr>
-                <a:spLocks noChangeAspect="1"/>
-              </p:cNvSpPr>
-              <p:nvPr/>
-            </p:nvSpPr>
-            <p:spPr>
-              <a:xfrm flipV="1">
-                <a:off x="-549480" y="2388181"/>
-                <a:ext cx="180000" cy="180000"/>
-              </a:xfrm>
-              <a:prstGeom prst="ellipse">
-                <a:avLst/>
-              </a:prstGeom>
-              <a:solidFill>
-                <a:schemeClr val="bg1"/>
-              </a:solidFill>
-              <a:ln>
-                <a:noFill/>
-              </a:ln>
-            </p:spPr>
-            <p:style>
-              <a:lnRef idx="2">
-                <a:schemeClr val="accent1">
-                  <a:shade val="50000"/>
-                </a:schemeClr>
-              </a:lnRef>
-              <a:fillRef idx="1">
-                <a:schemeClr val="accent1"/>
-              </a:fillRef>
-              <a:effectRef idx="0">
-                <a:schemeClr val="accent1"/>
-              </a:effectRef>
-              <a:fontRef idx="minor">
-                <a:schemeClr val="lt1"/>
-              </a:fontRef>
-            </p:style>
-            <p:txBody>
-              <a:bodyPr rtlCol="0" anchor="ctr"/>
-              <a:lstStyle/>
-              <a:p>
-                <a:pPr algn="ctr"/>
-                <a:endParaRPr lang="zh-TW" altLang="en-US" u="sng"/>
-              </a:p>
-            </p:txBody>
-          </p:sp>
-          <p:sp>
-            <p:nvSpPr>
-              <p:cNvPr id="262" name="橢圓 261"/>
-              <p:cNvSpPr>
-                <a:spLocks noChangeAspect="1"/>
-              </p:cNvSpPr>
-              <p:nvPr/>
-            </p:nvSpPr>
-            <p:spPr>
-              <a:xfrm>
-                <a:off x="-513496" y="2015614"/>
-                <a:ext cx="162000" cy="162000"/>
-              </a:xfrm>
-              <a:prstGeom prst="ellipse">
-                <a:avLst/>
-              </a:prstGeom>
-              <a:solidFill>
-                <a:srgbClr val="0033CC"/>
-              </a:solidFill>
-              <a:ln>
-                <a:noFill/>
-              </a:ln>
-            </p:spPr>
-            <p:style>
-              <a:lnRef idx="2">
-                <a:schemeClr val="accent1">
-                  <a:shade val="50000"/>
-                </a:schemeClr>
-              </a:lnRef>
-              <a:fillRef idx="1">
-                <a:schemeClr val="accent1"/>
-              </a:fillRef>
-              <a:effectRef idx="0">
-                <a:schemeClr val="accent1"/>
-              </a:effectRef>
-              <a:fontRef idx="minor">
-                <a:schemeClr val="lt1"/>
-              </a:fontRef>
-            </p:style>
-            <p:txBody>
-              <a:bodyPr rtlCol="0" anchor="ctr"/>
-              <a:lstStyle/>
-              <a:p>
-                <a:pPr algn="ctr"/>
-                <a:endParaRPr lang="zh-TW" altLang="en-US"/>
-              </a:p>
-            </p:txBody>
-          </p:sp>
+            </p:grpSpPr>
+            <p:sp>
+              <p:nvSpPr>
+                <p:cNvPr id="376" name="橢圓 375"/>
+                <p:cNvSpPr>
+                  <a:spLocks noChangeAspect="1"/>
+                </p:cNvSpPr>
+                <p:nvPr/>
+              </p:nvSpPr>
+              <p:spPr>
+                <a:xfrm>
+                  <a:off x="-2786384" y="2076590"/>
+                  <a:ext cx="432000" cy="432000"/>
+                </a:xfrm>
+                <a:prstGeom prst="ellipse">
+                  <a:avLst/>
+                </a:prstGeom>
+                <a:solidFill>
+                  <a:srgbClr val="FF0000"/>
+                </a:solidFill>
+                <a:ln>
+                  <a:noFill/>
+                </a:ln>
+              </p:spPr>
+              <p:style>
+                <a:lnRef idx="2">
+                  <a:schemeClr val="accent1">
+                    <a:shade val="50000"/>
+                  </a:schemeClr>
+                </a:lnRef>
+                <a:fillRef idx="1">
+                  <a:schemeClr val="accent1"/>
+                </a:fillRef>
+                <a:effectRef idx="0">
+                  <a:schemeClr val="accent1"/>
+                </a:effectRef>
+                <a:fontRef idx="minor">
+                  <a:schemeClr val="lt1"/>
+                </a:fontRef>
+              </p:style>
+              <p:txBody>
+                <a:bodyPr rtlCol="0" anchor="ctr"/>
+                <a:lstStyle/>
+                <a:p>
+                  <a:pPr algn="ctr"/>
+                  <a:endParaRPr lang="zh-TW" altLang="en-US"/>
+                </a:p>
+              </p:txBody>
+            </p:sp>
+            <p:sp>
+              <p:nvSpPr>
+                <p:cNvPr id="377" name="橢圓 376"/>
+                <p:cNvSpPr>
+                  <a:spLocks noChangeAspect="1"/>
+                </p:cNvSpPr>
+                <p:nvPr/>
+              </p:nvSpPr>
+              <p:spPr>
+                <a:xfrm>
+                  <a:off x="-3338318" y="2701377"/>
+                  <a:ext cx="396000" cy="396000"/>
+                </a:xfrm>
+                <a:prstGeom prst="ellipse">
+                  <a:avLst/>
+                </a:prstGeom>
+                <a:solidFill>
+                  <a:srgbClr val="FF9F00"/>
+                </a:solidFill>
+                <a:ln>
+                  <a:noFill/>
+                </a:ln>
+              </p:spPr>
+              <p:style>
+                <a:lnRef idx="2">
+                  <a:schemeClr val="accent1">
+                    <a:shade val="50000"/>
+                  </a:schemeClr>
+                </a:lnRef>
+                <a:fillRef idx="1">
+                  <a:schemeClr val="accent1"/>
+                </a:fillRef>
+                <a:effectRef idx="0">
+                  <a:schemeClr val="accent1"/>
+                </a:effectRef>
+                <a:fontRef idx="minor">
+                  <a:schemeClr val="lt1"/>
+                </a:fontRef>
+              </p:style>
+              <p:txBody>
+                <a:bodyPr rtlCol="0" anchor="ctr"/>
+                <a:lstStyle/>
+                <a:p>
+                  <a:pPr algn="ctr"/>
+                  <a:endParaRPr lang="zh-TW" altLang="en-US"/>
+                </a:p>
+              </p:txBody>
+            </p:sp>
+            <p:sp>
+              <p:nvSpPr>
+                <p:cNvPr id="378" name="橢圓 377"/>
+                <p:cNvSpPr>
+                  <a:spLocks noChangeAspect="1"/>
+                </p:cNvSpPr>
+                <p:nvPr/>
+              </p:nvSpPr>
+              <p:spPr>
+                <a:xfrm>
+                  <a:off x="-3608530" y="2969089"/>
+                  <a:ext cx="360000" cy="360000"/>
+                </a:xfrm>
+                <a:prstGeom prst="ellipse">
+                  <a:avLst/>
+                </a:prstGeom>
+                <a:solidFill>
+                  <a:srgbClr val="FFC600"/>
+                </a:solidFill>
+                <a:ln>
+                  <a:noFill/>
+                </a:ln>
+              </p:spPr>
+              <p:style>
+                <a:lnRef idx="2">
+                  <a:schemeClr val="accent1">
+                    <a:shade val="50000"/>
+                  </a:schemeClr>
+                </a:lnRef>
+                <a:fillRef idx="1">
+                  <a:schemeClr val="accent1"/>
+                </a:fillRef>
+                <a:effectRef idx="0">
+                  <a:schemeClr val="accent1"/>
+                </a:effectRef>
+                <a:fontRef idx="minor">
+                  <a:schemeClr val="lt1"/>
+                </a:fontRef>
+              </p:style>
+              <p:txBody>
+                <a:bodyPr rtlCol="0" anchor="ctr"/>
+                <a:lstStyle/>
+                <a:p>
+                  <a:pPr algn="ctr"/>
+                  <a:endParaRPr lang="zh-TW" altLang="en-US"/>
+                </a:p>
+              </p:txBody>
+            </p:sp>
+            <p:sp>
+              <p:nvSpPr>
+                <p:cNvPr id="379" name="橢圓 378"/>
+                <p:cNvSpPr>
+                  <a:spLocks noChangeAspect="1"/>
+                </p:cNvSpPr>
+                <p:nvPr/>
+              </p:nvSpPr>
+              <p:spPr>
+                <a:xfrm>
+                  <a:off x="-3990334" y="3017923"/>
+                  <a:ext cx="324000" cy="324000"/>
+                </a:xfrm>
+                <a:prstGeom prst="ellipse">
+                  <a:avLst/>
+                </a:prstGeom>
+                <a:solidFill>
+                  <a:srgbClr val="FFFA00"/>
+                </a:solidFill>
+                <a:ln>
+                  <a:noFill/>
+                </a:ln>
+              </p:spPr>
+              <p:style>
+                <a:lnRef idx="2">
+                  <a:schemeClr val="accent1">
+                    <a:shade val="50000"/>
+                  </a:schemeClr>
+                </a:lnRef>
+                <a:fillRef idx="1">
+                  <a:schemeClr val="accent1"/>
+                </a:fillRef>
+                <a:effectRef idx="0">
+                  <a:schemeClr val="accent1"/>
+                </a:effectRef>
+                <a:fontRef idx="minor">
+                  <a:schemeClr val="lt1"/>
+                </a:fontRef>
+              </p:style>
+              <p:txBody>
+                <a:bodyPr rtlCol="0" anchor="ctr"/>
+                <a:lstStyle/>
+                <a:p>
+                  <a:pPr algn="ctr"/>
+                  <a:endParaRPr lang="zh-TW" altLang="en-US"/>
+                </a:p>
+              </p:txBody>
+            </p:sp>
+            <p:sp>
+              <p:nvSpPr>
+                <p:cNvPr id="380" name="橢圓 379"/>
+                <p:cNvSpPr>
+                  <a:spLocks noChangeAspect="1"/>
+                </p:cNvSpPr>
+                <p:nvPr/>
+              </p:nvSpPr>
+              <p:spPr>
+                <a:xfrm>
+                  <a:off x="-4305625" y="2885667"/>
+                  <a:ext cx="288000" cy="288000"/>
+                </a:xfrm>
+                <a:prstGeom prst="ellipse">
+                  <a:avLst/>
+                </a:prstGeom>
+                <a:solidFill>
+                  <a:srgbClr val="D8FF00"/>
+                </a:solidFill>
+                <a:ln>
+                  <a:noFill/>
+                </a:ln>
+              </p:spPr>
+              <p:style>
+                <a:lnRef idx="2">
+                  <a:schemeClr val="accent1">
+                    <a:shade val="50000"/>
+                  </a:schemeClr>
+                </a:lnRef>
+                <a:fillRef idx="1">
+                  <a:schemeClr val="accent1"/>
+                </a:fillRef>
+                <a:effectRef idx="0">
+                  <a:schemeClr val="accent1"/>
+                </a:effectRef>
+                <a:fontRef idx="minor">
+                  <a:schemeClr val="lt1"/>
+                </a:fontRef>
+              </p:style>
+              <p:txBody>
+                <a:bodyPr rtlCol="0" anchor="ctr"/>
+                <a:lstStyle/>
+                <a:p>
+                  <a:pPr algn="ctr"/>
+                  <a:endParaRPr lang="zh-TW" altLang="en-US"/>
+                </a:p>
+              </p:txBody>
+            </p:sp>
+            <p:sp>
+              <p:nvSpPr>
+                <p:cNvPr id="381" name="橢圓 380"/>
+                <p:cNvSpPr>
+                  <a:spLocks noChangeAspect="1"/>
+                </p:cNvSpPr>
+                <p:nvPr/>
+              </p:nvSpPr>
+              <p:spPr>
+                <a:xfrm>
+                  <a:off x="-4505237" y="2663954"/>
+                  <a:ext cx="252000" cy="252000"/>
+                </a:xfrm>
+                <a:prstGeom prst="ellipse">
+                  <a:avLst/>
+                </a:prstGeom>
+                <a:solidFill>
+                  <a:srgbClr val="70FF00"/>
+                </a:solidFill>
+                <a:ln>
+                  <a:noFill/>
+                </a:ln>
+              </p:spPr>
+              <p:style>
+                <a:lnRef idx="2">
+                  <a:schemeClr val="accent1">
+                    <a:shade val="50000"/>
+                  </a:schemeClr>
+                </a:lnRef>
+                <a:fillRef idx="1">
+                  <a:schemeClr val="accent1"/>
+                </a:fillRef>
+                <a:effectRef idx="0">
+                  <a:schemeClr val="accent1"/>
+                </a:effectRef>
+                <a:fontRef idx="minor">
+                  <a:schemeClr val="lt1"/>
+                </a:fontRef>
+              </p:style>
+              <p:txBody>
+                <a:bodyPr rtlCol="0" anchor="ctr"/>
+                <a:lstStyle/>
+                <a:p>
+                  <a:pPr algn="ctr"/>
+                  <a:endParaRPr lang="zh-TW" altLang="en-US"/>
+                </a:p>
+              </p:txBody>
+            </p:sp>
+            <p:sp>
+              <p:nvSpPr>
+                <p:cNvPr id="382" name="橢圓 381"/>
+                <p:cNvSpPr>
+                  <a:spLocks noChangeAspect="1"/>
+                </p:cNvSpPr>
+                <p:nvPr/>
+              </p:nvSpPr>
+              <p:spPr>
+                <a:xfrm>
+                  <a:off x="-4651633" y="2448523"/>
+                  <a:ext cx="216000" cy="216000"/>
+                </a:xfrm>
+                <a:prstGeom prst="ellipse">
+                  <a:avLst/>
+                </a:prstGeom>
+                <a:solidFill>
+                  <a:srgbClr val="09FF00"/>
+                </a:solidFill>
+                <a:ln>
+                  <a:noFill/>
+                </a:ln>
+              </p:spPr>
+              <p:style>
+                <a:lnRef idx="2">
+                  <a:schemeClr val="accent1">
+                    <a:shade val="50000"/>
+                  </a:schemeClr>
+                </a:lnRef>
+                <a:fillRef idx="1">
+                  <a:schemeClr val="accent1"/>
+                </a:fillRef>
+                <a:effectRef idx="0">
+                  <a:schemeClr val="accent1"/>
+                </a:effectRef>
+                <a:fontRef idx="minor">
+                  <a:schemeClr val="lt1"/>
+                </a:fontRef>
+              </p:style>
+              <p:txBody>
+                <a:bodyPr rtlCol="0" anchor="ctr"/>
+                <a:lstStyle/>
+                <a:p>
+                  <a:pPr algn="ctr"/>
+                  <a:endParaRPr lang="zh-TW" altLang="en-US"/>
+                </a:p>
+              </p:txBody>
+            </p:sp>
+            <p:sp>
+              <p:nvSpPr>
+                <p:cNvPr id="383" name="橢圓 382"/>
+                <p:cNvSpPr>
+                  <a:spLocks noChangeAspect="1"/>
+                </p:cNvSpPr>
+                <p:nvPr/>
+              </p:nvSpPr>
+              <p:spPr>
+                <a:xfrm>
+                  <a:off x="-4705200" y="2216560"/>
+                  <a:ext cx="144000" cy="144000"/>
+                </a:xfrm>
+                <a:prstGeom prst="ellipse">
+                  <a:avLst/>
+                </a:prstGeom>
+                <a:solidFill>
+                  <a:srgbClr val="00FFFF"/>
+                </a:solidFill>
+                <a:ln>
+                  <a:noFill/>
+                </a:ln>
+              </p:spPr>
+              <p:style>
+                <a:lnRef idx="2">
+                  <a:schemeClr val="accent1">
+                    <a:shade val="50000"/>
+                  </a:schemeClr>
+                </a:lnRef>
+                <a:fillRef idx="1">
+                  <a:schemeClr val="accent1"/>
+                </a:fillRef>
+                <a:effectRef idx="0">
+                  <a:schemeClr val="accent1"/>
+                </a:effectRef>
+                <a:fontRef idx="minor">
+                  <a:schemeClr val="lt1"/>
+                </a:fontRef>
+              </p:style>
+              <p:txBody>
+                <a:bodyPr rtlCol="0" anchor="ctr"/>
+                <a:lstStyle/>
+                <a:p>
+                  <a:pPr algn="ctr"/>
+                  <a:endParaRPr lang="zh-TW" altLang="en-US"/>
+                </a:p>
+              </p:txBody>
+            </p:sp>
+            <p:sp>
+              <p:nvSpPr>
+                <p:cNvPr id="384" name="橢圓 383"/>
+                <p:cNvSpPr>
+                  <a:spLocks noChangeAspect="1"/>
+                </p:cNvSpPr>
+                <p:nvPr/>
+              </p:nvSpPr>
+              <p:spPr>
+                <a:xfrm>
+                  <a:off x="-3075358" y="2385767"/>
+                  <a:ext cx="414000" cy="414000"/>
+                </a:xfrm>
+                <a:prstGeom prst="ellipse">
+                  <a:avLst/>
+                </a:prstGeom>
+                <a:solidFill>
+                  <a:srgbClr val="FF5400"/>
+                </a:solidFill>
+                <a:ln>
+                  <a:noFill/>
+                </a:ln>
+              </p:spPr>
+              <p:style>
+                <a:lnRef idx="2">
+                  <a:schemeClr val="accent1">
+                    <a:shade val="50000"/>
+                  </a:schemeClr>
+                </a:lnRef>
+                <a:fillRef idx="1">
+                  <a:schemeClr val="accent1"/>
+                </a:fillRef>
+                <a:effectRef idx="0">
+                  <a:schemeClr val="accent1"/>
+                </a:effectRef>
+                <a:fontRef idx="minor">
+                  <a:schemeClr val="lt1"/>
+                </a:fontRef>
+              </p:style>
+              <p:txBody>
+                <a:bodyPr rtlCol="0" anchor="ctr"/>
+                <a:lstStyle/>
+                <a:p>
+                  <a:pPr algn="ctr"/>
+                  <a:endParaRPr lang="zh-TW" altLang="en-US"/>
+                </a:p>
+              </p:txBody>
+            </p:sp>
+            <p:sp>
+              <p:nvSpPr>
+                <p:cNvPr id="385" name="橢圓 384"/>
+                <p:cNvSpPr>
+                  <a:spLocks noChangeAspect="1"/>
+                </p:cNvSpPr>
+                <p:nvPr/>
+              </p:nvSpPr>
+              <p:spPr>
+                <a:xfrm flipV="1">
+                  <a:off x="-3920058" y="1002272"/>
+                  <a:ext cx="396000" cy="396000"/>
+                </a:xfrm>
+                <a:prstGeom prst="ellipse">
+                  <a:avLst/>
+                </a:prstGeom>
+                <a:solidFill>
+                  <a:schemeClr val="bg1"/>
+                </a:solidFill>
+                <a:ln>
+                  <a:noFill/>
+                </a:ln>
+              </p:spPr>
+              <p:style>
+                <a:lnRef idx="2">
+                  <a:schemeClr val="accent1">
+                    <a:shade val="50000"/>
+                  </a:schemeClr>
+                </a:lnRef>
+                <a:fillRef idx="1">
+                  <a:schemeClr val="accent1"/>
+                </a:fillRef>
+                <a:effectRef idx="0">
+                  <a:schemeClr val="accent1"/>
+                </a:effectRef>
+                <a:fontRef idx="minor">
+                  <a:schemeClr val="lt1"/>
+                </a:fontRef>
+              </p:style>
+              <p:txBody>
+                <a:bodyPr rtlCol="0" anchor="ctr"/>
+                <a:lstStyle/>
+                <a:p>
+                  <a:pPr algn="ctr"/>
+                  <a:endParaRPr lang="zh-TW" altLang="en-US" u="sng"/>
+                </a:p>
+              </p:txBody>
+            </p:sp>
+            <p:sp>
+              <p:nvSpPr>
+                <p:cNvPr id="386" name="橢圓 385"/>
+                <p:cNvSpPr>
+                  <a:spLocks noChangeAspect="1"/>
+                </p:cNvSpPr>
+                <p:nvPr/>
+              </p:nvSpPr>
+              <p:spPr>
+                <a:xfrm flipV="1">
+                  <a:off x="-4238942" y="1109345"/>
+                  <a:ext cx="324000" cy="324000"/>
+                </a:xfrm>
+                <a:prstGeom prst="ellipse">
+                  <a:avLst/>
+                </a:prstGeom>
+                <a:solidFill>
+                  <a:schemeClr val="bg1"/>
+                </a:solidFill>
+                <a:ln>
+                  <a:noFill/>
+                </a:ln>
+              </p:spPr>
+              <p:style>
+                <a:lnRef idx="2">
+                  <a:schemeClr val="accent1">
+                    <a:shade val="50000"/>
+                  </a:schemeClr>
+                </a:lnRef>
+                <a:fillRef idx="1">
+                  <a:schemeClr val="accent1"/>
+                </a:fillRef>
+                <a:effectRef idx="0">
+                  <a:schemeClr val="accent1"/>
+                </a:effectRef>
+                <a:fontRef idx="minor">
+                  <a:schemeClr val="lt1"/>
+                </a:fontRef>
+              </p:style>
+              <p:txBody>
+                <a:bodyPr rtlCol="0" anchor="ctr"/>
+                <a:lstStyle/>
+                <a:p>
+                  <a:pPr algn="ctr"/>
+                  <a:endParaRPr lang="zh-TW" altLang="en-US" u="sng"/>
+                </a:p>
+              </p:txBody>
+            </p:sp>
+            <p:sp>
+              <p:nvSpPr>
+                <p:cNvPr id="387" name="橢圓 386"/>
+                <p:cNvSpPr>
+                  <a:spLocks noChangeAspect="1"/>
+                </p:cNvSpPr>
+                <p:nvPr/>
+              </p:nvSpPr>
+              <p:spPr>
+                <a:xfrm flipV="1">
+                  <a:off x="-4474214" y="1341662"/>
+                  <a:ext cx="288000" cy="288000"/>
+                </a:xfrm>
+                <a:prstGeom prst="ellipse">
+                  <a:avLst/>
+                </a:prstGeom>
+                <a:solidFill>
+                  <a:schemeClr val="bg1"/>
+                </a:solidFill>
+                <a:ln>
+                  <a:noFill/>
+                </a:ln>
+              </p:spPr>
+              <p:style>
+                <a:lnRef idx="2">
+                  <a:schemeClr val="accent1">
+                    <a:shade val="50000"/>
+                  </a:schemeClr>
+                </a:lnRef>
+                <a:fillRef idx="1">
+                  <a:schemeClr val="accent1"/>
+                </a:fillRef>
+                <a:effectRef idx="0">
+                  <a:schemeClr val="accent1"/>
+                </a:effectRef>
+                <a:fontRef idx="minor">
+                  <a:schemeClr val="lt1"/>
+                </a:fontRef>
+              </p:style>
+              <p:txBody>
+                <a:bodyPr rtlCol="0" anchor="ctr"/>
+                <a:lstStyle/>
+                <a:p>
+                  <a:pPr algn="ctr"/>
+                  <a:endParaRPr lang="zh-TW" altLang="en-US" u="sng"/>
+                </a:p>
+              </p:txBody>
+            </p:sp>
+            <p:sp>
+              <p:nvSpPr>
+                <p:cNvPr id="388" name="橢圓 387"/>
+                <p:cNvSpPr>
+                  <a:spLocks noChangeAspect="1"/>
+                </p:cNvSpPr>
+                <p:nvPr/>
+              </p:nvSpPr>
+              <p:spPr>
+                <a:xfrm flipV="1">
+                  <a:off x="-4629106" y="1618372"/>
+                  <a:ext cx="252000" cy="252000"/>
+                </a:xfrm>
+                <a:prstGeom prst="ellipse">
+                  <a:avLst/>
+                </a:prstGeom>
+                <a:solidFill>
+                  <a:schemeClr val="bg1"/>
+                </a:solidFill>
+                <a:ln>
+                  <a:noFill/>
+                </a:ln>
+              </p:spPr>
+              <p:style>
+                <a:lnRef idx="2">
+                  <a:schemeClr val="accent1">
+                    <a:shade val="50000"/>
+                  </a:schemeClr>
+                </a:lnRef>
+                <a:fillRef idx="1">
+                  <a:schemeClr val="accent1"/>
+                </a:fillRef>
+                <a:effectRef idx="0">
+                  <a:schemeClr val="accent1"/>
+                </a:effectRef>
+                <a:fontRef idx="minor">
+                  <a:schemeClr val="lt1"/>
+                </a:fontRef>
+              </p:style>
+              <p:txBody>
+                <a:bodyPr rtlCol="0" anchor="ctr"/>
+                <a:lstStyle/>
+                <a:p>
+                  <a:pPr algn="ctr"/>
+                  <a:endParaRPr lang="zh-TW" altLang="en-US" u="sng"/>
+                </a:p>
+              </p:txBody>
+            </p:sp>
+            <p:sp>
+              <p:nvSpPr>
+                <p:cNvPr id="389" name="橢圓 388"/>
+                <p:cNvSpPr>
+                  <a:spLocks noChangeAspect="1"/>
+                </p:cNvSpPr>
+                <p:nvPr/>
+              </p:nvSpPr>
+              <p:spPr>
+                <a:xfrm>
+                  <a:off x="-4703237" y="1915159"/>
+                  <a:ext cx="216000" cy="216000"/>
+                </a:xfrm>
+                <a:prstGeom prst="ellipse">
+                  <a:avLst/>
+                </a:prstGeom>
+                <a:solidFill>
+                  <a:schemeClr val="bg1"/>
+                </a:solidFill>
+                <a:ln>
+                  <a:noFill/>
+                </a:ln>
+              </p:spPr>
+              <p:style>
+                <a:lnRef idx="2">
+                  <a:schemeClr val="accent1">
+                    <a:shade val="50000"/>
+                  </a:schemeClr>
+                </a:lnRef>
+                <a:fillRef idx="1">
+                  <a:schemeClr val="accent1"/>
+                </a:fillRef>
+                <a:effectRef idx="0">
+                  <a:schemeClr val="accent1"/>
+                </a:effectRef>
+                <a:fontRef idx="minor">
+                  <a:schemeClr val="lt1"/>
+                </a:fontRef>
+              </p:style>
+              <p:txBody>
+                <a:bodyPr rtlCol="0" anchor="ctr"/>
+                <a:lstStyle/>
+                <a:p>
+                  <a:pPr algn="ctr"/>
+                  <a:endParaRPr lang="zh-TW" altLang="en-US"/>
+                </a:p>
+              </p:txBody>
+            </p:sp>
+            <p:sp>
+              <p:nvSpPr>
+                <p:cNvPr id="390" name="橢圓 389"/>
+                <p:cNvSpPr>
+                  <a:spLocks noChangeAspect="1"/>
+                </p:cNvSpPr>
+                <p:nvPr/>
+              </p:nvSpPr>
+              <p:spPr>
+                <a:xfrm>
+                  <a:off x="-3525166" y="1120889"/>
+                  <a:ext cx="324000" cy="324000"/>
+                </a:xfrm>
+                <a:prstGeom prst="ellipse">
+                  <a:avLst/>
+                </a:prstGeom>
+                <a:solidFill>
+                  <a:schemeClr val="bg1"/>
+                </a:solidFill>
+                <a:ln>
+                  <a:noFill/>
+                </a:ln>
+              </p:spPr>
+              <p:style>
+                <a:lnRef idx="2">
+                  <a:schemeClr val="accent1">
+                    <a:shade val="50000"/>
+                  </a:schemeClr>
+                </a:lnRef>
+                <a:fillRef idx="1">
+                  <a:schemeClr val="accent1"/>
+                </a:fillRef>
+                <a:effectRef idx="0">
+                  <a:schemeClr val="accent1"/>
+                </a:effectRef>
+                <a:fontRef idx="minor">
+                  <a:schemeClr val="lt1"/>
+                </a:fontRef>
+              </p:style>
+              <p:txBody>
+                <a:bodyPr rtlCol="0" anchor="ctr"/>
+                <a:lstStyle/>
+                <a:p>
+                  <a:pPr algn="ctr"/>
+                  <a:endParaRPr lang="zh-TW" altLang="en-US"/>
+                </a:p>
+              </p:txBody>
+            </p:sp>
+            <p:sp>
+              <p:nvSpPr>
+                <p:cNvPr id="391" name="橢圓 390"/>
+                <p:cNvSpPr>
+                  <a:spLocks noChangeAspect="1"/>
+                </p:cNvSpPr>
+                <p:nvPr/>
+              </p:nvSpPr>
+              <p:spPr>
+                <a:xfrm>
+                  <a:off x="-3229390" y="1329997"/>
+                  <a:ext cx="288000" cy="288000"/>
+                </a:xfrm>
+                <a:prstGeom prst="ellipse">
+                  <a:avLst/>
+                </a:prstGeom>
+                <a:solidFill>
+                  <a:schemeClr val="bg1"/>
+                </a:solidFill>
+                <a:ln>
+                  <a:noFill/>
+                </a:ln>
+              </p:spPr>
+              <p:style>
+                <a:lnRef idx="2">
+                  <a:schemeClr val="accent1">
+                    <a:shade val="50000"/>
+                  </a:schemeClr>
+                </a:lnRef>
+                <a:fillRef idx="1">
+                  <a:schemeClr val="accent1"/>
+                </a:fillRef>
+                <a:effectRef idx="0">
+                  <a:schemeClr val="accent1"/>
+                </a:effectRef>
+                <a:fontRef idx="minor">
+                  <a:schemeClr val="lt1"/>
+                </a:fontRef>
+              </p:style>
+              <p:txBody>
+                <a:bodyPr rtlCol="0" anchor="ctr"/>
+                <a:lstStyle/>
+                <a:p>
+                  <a:pPr algn="ctr"/>
+                  <a:endParaRPr lang="zh-TW" altLang="en-US"/>
+                </a:p>
+              </p:txBody>
+            </p:sp>
+            <p:sp>
+              <p:nvSpPr>
+                <p:cNvPr id="392" name="橢圓 391"/>
+                <p:cNvSpPr>
+                  <a:spLocks noChangeAspect="1"/>
+                </p:cNvSpPr>
+                <p:nvPr/>
+              </p:nvSpPr>
+              <p:spPr>
+                <a:xfrm>
+                  <a:off x="-3012647" y="1620568"/>
+                  <a:ext cx="252000" cy="252000"/>
+                </a:xfrm>
+                <a:prstGeom prst="ellipse">
+                  <a:avLst/>
+                </a:prstGeom>
+                <a:solidFill>
+                  <a:schemeClr val="bg1"/>
+                </a:solidFill>
+                <a:ln>
+                  <a:noFill/>
+                </a:ln>
+              </p:spPr>
+              <p:style>
+                <a:lnRef idx="2">
+                  <a:schemeClr val="accent1">
+                    <a:shade val="50000"/>
+                  </a:schemeClr>
+                </a:lnRef>
+                <a:fillRef idx="1">
+                  <a:schemeClr val="accent1"/>
+                </a:fillRef>
+                <a:effectRef idx="0">
+                  <a:schemeClr val="accent1"/>
+                </a:effectRef>
+                <a:fontRef idx="minor">
+                  <a:schemeClr val="lt1"/>
+                </a:fontRef>
+              </p:style>
+              <p:txBody>
+                <a:bodyPr rtlCol="0" anchor="ctr"/>
+                <a:lstStyle/>
+                <a:p>
+                  <a:pPr algn="ctr"/>
+                  <a:endParaRPr lang="zh-TW" altLang="en-US"/>
+                </a:p>
+              </p:txBody>
+            </p:sp>
+            <p:sp>
+              <p:nvSpPr>
+                <p:cNvPr id="393" name="橢圓 392"/>
+                <p:cNvSpPr>
+                  <a:spLocks noChangeAspect="1"/>
+                </p:cNvSpPr>
+                <p:nvPr/>
+              </p:nvSpPr>
+              <p:spPr>
+                <a:xfrm>
+                  <a:off x="-2838688" y="1908138"/>
+                  <a:ext cx="180000" cy="180000"/>
+                </a:xfrm>
+                <a:prstGeom prst="ellipse">
+                  <a:avLst/>
+                </a:prstGeom>
+                <a:solidFill>
+                  <a:schemeClr val="bg1"/>
+                </a:solidFill>
+                <a:ln>
+                  <a:noFill/>
+                </a:ln>
+              </p:spPr>
+              <p:style>
+                <a:lnRef idx="2">
+                  <a:schemeClr val="accent1">
+                    <a:shade val="50000"/>
+                  </a:schemeClr>
+                </a:lnRef>
+                <a:fillRef idx="1">
+                  <a:schemeClr val="accent1"/>
+                </a:fillRef>
+                <a:effectRef idx="0">
+                  <a:schemeClr val="accent1"/>
+                </a:effectRef>
+                <a:fontRef idx="minor">
+                  <a:schemeClr val="lt1"/>
+                </a:fontRef>
+              </p:style>
+              <p:txBody>
+                <a:bodyPr rtlCol="0" anchor="ctr"/>
+                <a:lstStyle/>
+                <a:p>
+                  <a:pPr algn="ctr"/>
+                  <a:endParaRPr lang="zh-TW" altLang="en-US"/>
+                </a:p>
+              </p:txBody>
+            </p:sp>
+            <p:sp>
+              <p:nvSpPr>
+                <p:cNvPr id="394" name="橢圓 393"/>
+                <p:cNvSpPr>
+                  <a:spLocks noChangeAspect="1"/>
+                </p:cNvSpPr>
+                <p:nvPr/>
+              </p:nvSpPr>
+              <p:spPr>
+                <a:xfrm flipV="1">
+                  <a:off x="-1535570" y="2982507"/>
+                  <a:ext cx="396000" cy="396000"/>
+                </a:xfrm>
+                <a:prstGeom prst="ellipse">
+                  <a:avLst/>
+                </a:prstGeom>
+                <a:solidFill>
+                  <a:schemeClr val="bg1"/>
+                </a:solidFill>
+                <a:ln>
+                  <a:noFill/>
+                </a:ln>
+              </p:spPr>
+              <p:style>
+                <a:lnRef idx="2">
+                  <a:schemeClr val="accent1">
+                    <a:shade val="50000"/>
+                  </a:schemeClr>
+                </a:lnRef>
+                <a:fillRef idx="1">
+                  <a:schemeClr val="accent1"/>
+                </a:fillRef>
+                <a:effectRef idx="0">
+                  <a:schemeClr val="accent1"/>
+                </a:effectRef>
+                <a:fontRef idx="minor">
+                  <a:schemeClr val="lt1"/>
+                </a:fontRef>
+              </p:style>
+              <p:txBody>
+                <a:bodyPr rtlCol="0" anchor="ctr"/>
+                <a:lstStyle/>
+                <a:p>
+                  <a:pPr algn="ctr"/>
+                  <a:endParaRPr lang="zh-TW" altLang="en-US" u="sng"/>
+                </a:p>
+              </p:txBody>
+            </p:sp>
+            <p:sp>
+              <p:nvSpPr>
+                <p:cNvPr id="395" name="橢圓 394"/>
+                <p:cNvSpPr>
+                  <a:spLocks noChangeAspect="1"/>
+                </p:cNvSpPr>
+                <p:nvPr/>
+              </p:nvSpPr>
+              <p:spPr>
+                <a:xfrm flipV="1">
+                  <a:off x="-1144686" y="2947434"/>
+                  <a:ext cx="324000" cy="324000"/>
+                </a:xfrm>
+                <a:prstGeom prst="ellipse">
+                  <a:avLst/>
+                </a:prstGeom>
+                <a:solidFill>
+                  <a:schemeClr val="bg1"/>
+                </a:solidFill>
+                <a:ln>
+                  <a:noFill/>
+                </a:ln>
+              </p:spPr>
+              <p:style>
+                <a:lnRef idx="2">
+                  <a:schemeClr val="accent1">
+                    <a:shade val="50000"/>
+                  </a:schemeClr>
+                </a:lnRef>
+                <a:fillRef idx="1">
+                  <a:schemeClr val="accent1"/>
+                </a:fillRef>
+                <a:effectRef idx="0">
+                  <a:schemeClr val="accent1"/>
+                </a:effectRef>
+                <a:fontRef idx="minor">
+                  <a:schemeClr val="lt1"/>
+                </a:fontRef>
+              </p:style>
+              <p:txBody>
+                <a:bodyPr rtlCol="0" anchor="ctr"/>
+                <a:lstStyle/>
+                <a:p>
+                  <a:pPr algn="ctr"/>
+                  <a:endParaRPr lang="zh-TW" altLang="en-US" u="sng"/>
+                </a:p>
+              </p:txBody>
+            </p:sp>
+            <p:sp>
+              <p:nvSpPr>
+                <p:cNvPr id="396" name="橢圓 395"/>
+                <p:cNvSpPr>
+                  <a:spLocks noChangeAspect="1"/>
+                </p:cNvSpPr>
+                <p:nvPr/>
+              </p:nvSpPr>
+              <p:spPr>
+                <a:xfrm flipV="1">
+                  <a:off x="-858814" y="2829339"/>
+                  <a:ext cx="288000" cy="288000"/>
+                </a:xfrm>
+                <a:prstGeom prst="ellipse">
+                  <a:avLst/>
+                </a:prstGeom>
+                <a:solidFill>
+                  <a:schemeClr val="bg1"/>
+                </a:solidFill>
+                <a:ln>
+                  <a:noFill/>
+                </a:ln>
+              </p:spPr>
+              <p:style>
+                <a:lnRef idx="2">
+                  <a:schemeClr val="accent1">
+                    <a:shade val="50000"/>
+                  </a:schemeClr>
+                </a:lnRef>
+                <a:fillRef idx="1">
+                  <a:schemeClr val="accent1"/>
+                </a:fillRef>
+                <a:effectRef idx="0">
+                  <a:schemeClr val="accent1"/>
+                </a:effectRef>
+                <a:fontRef idx="minor">
+                  <a:schemeClr val="lt1"/>
+                </a:fontRef>
+              </p:style>
+              <p:txBody>
+                <a:bodyPr rtlCol="0" anchor="ctr"/>
+                <a:lstStyle/>
+                <a:p>
+                  <a:pPr algn="ctr"/>
+                  <a:endParaRPr lang="zh-TW" altLang="en-US" u="sng"/>
+                </a:p>
+              </p:txBody>
+            </p:sp>
+            <p:sp>
+              <p:nvSpPr>
+                <p:cNvPr id="397" name="橢圓 396"/>
+                <p:cNvSpPr>
+                  <a:spLocks noChangeAspect="1"/>
+                </p:cNvSpPr>
+                <p:nvPr/>
+              </p:nvSpPr>
+              <p:spPr>
+                <a:xfrm flipV="1">
+                  <a:off x="-664386" y="2598350"/>
+                  <a:ext cx="252000" cy="252000"/>
+                </a:xfrm>
+                <a:prstGeom prst="ellipse">
+                  <a:avLst/>
+                </a:prstGeom>
+                <a:solidFill>
+                  <a:schemeClr val="bg1"/>
+                </a:solidFill>
+                <a:ln>
+                  <a:noFill/>
+                </a:ln>
+              </p:spPr>
+              <p:style>
+                <a:lnRef idx="2">
+                  <a:schemeClr val="accent1">
+                    <a:shade val="50000"/>
+                  </a:schemeClr>
+                </a:lnRef>
+                <a:fillRef idx="1">
+                  <a:schemeClr val="accent1"/>
+                </a:fillRef>
+                <a:effectRef idx="0">
+                  <a:schemeClr val="accent1"/>
+                </a:effectRef>
+                <a:fontRef idx="minor">
+                  <a:schemeClr val="lt1"/>
+                </a:fontRef>
+              </p:style>
+              <p:txBody>
+                <a:bodyPr rtlCol="0" anchor="ctr"/>
+                <a:lstStyle/>
+                <a:p>
+                  <a:pPr algn="ctr"/>
+                  <a:endParaRPr lang="zh-TW" altLang="en-US" u="sng"/>
+                </a:p>
+              </p:txBody>
+            </p:sp>
+            <p:sp>
+              <p:nvSpPr>
+                <p:cNvPr id="398" name="橢圓 397"/>
+                <p:cNvSpPr>
+                  <a:spLocks noChangeAspect="1"/>
+                </p:cNvSpPr>
+                <p:nvPr/>
+              </p:nvSpPr>
+              <p:spPr>
+                <a:xfrm>
+                  <a:off x="-1862367" y="2983799"/>
+                  <a:ext cx="324000" cy="324000"/>
+                </a:xfrm>
+                <a:prstGeom prst="ellipse">
+                  <a:avLst/>
+                </a:prstGeom>
+                <a:solidFill>
+                  <a:schemeClr val="bg1"/>
+                </a:solidFill>
+                <a:ln>
+                  <a:noFill/>
+                </a:ln>
+              </p:spPr>
+              <p:style>
+                <a:lnRef idx="2">
+                  <a:schemeClr val="accent1">
+                    <a:shade val="50000"/>
+                  </a:schemeClr>
+                </a:lnRef>
+                <a:fillRef idx="1">
+                  <a:schemeClr val="accent1"/>
+                </a:fillRef>
+                <a:effectRef idx="0">
+                  <a:schemeClr val="accent1"/>
+                </a:effectRef>
+                <a:fontRef idx="minor">
+                  <a:schemeClr val="lt1"/>
+                </a:fontRef>
+              </p:style>
+              <p:txBody>
+                <a:bodyPr rtlCol="0" anchor="ctr"/>
+                <a:lstStyle/>
+                <a:p>
+                  <a:pPr algn="ctr"/>
+                  <a:endParaRPr lang="zh-TW" altLang="en-US"/>
+                </a:p>
+              </p:txBody>
+            </p:sp>
+            <p:sp>
+              <p:nvSpPr>
+                <p:cNvPr id="399" name="橢圓 398"/>
+                <p:cNvSpPr>
+                  <a:spLocks noChangeAspect="1"/>
+                </p:cNvSpPr>
+                <p:nvPr/>
+              </p:nvSpPr>
+              <p:spPr>
+                <a:xfrm>
+                  <a:off x="-2158699" y="2807669"/>
+                  <a:ext cx="288000" cy="288000"/>
+                </a:xfrm>
+                <a:prstGeom prst="ellipse">
+                  <a:avLst/>
+                </a:prstGeom>
+                <a:solidFill>
+                  <a:schemeClr val="bg1"/>
+                </a:solidFill>
+                <a:ln>
+                  <a:noFill/>
+                </a:ln>
+              </p:spPr>
+              <p:style>
+                <a:lnRef idx="2">
+                  <a:schemeClr val="accent1">
+                    <a:shade val="50000"/>
+                  </a:schemeClr>
+                </a:lnRef>
+                <a:fillRef idx="1">
+                  <a:schemeClr val="accent1"/>
+                </a:fillRef>
+                <a:effectRef idx="0">
+                  <a:schemeClr val="accent1"/>
+                </a:effectRef>
+                <a:fontRef idx="minor">
+                  <a:schemeClr val="lt1"/>
+                </a:fontRef>
+              </p:style>
+              <p:txBody>
+                <a:bodyPr rtlCol="0" anchor="ctr"/>
+                <a:lstStyle/>
+                <a:p>
+                  <a:pPr algn="ctr"/>
+                  <a:endParaRPr lang="zh-TW" altLang="en-US"/>
+                </a:p>
+              </p:txBody>
+            </p:sp>
+            <p:sp>
+              <p:nvSpPr>
+                <p:cNvPr id="400" name="橢圓 399"/>
+                <p:cNvSpPr>
+                  <a:spLocks noChangeAspect="1"/>
+                </p:cNvSpPr>
+                <p:nvPr/>
+              </p:nvSpPr>
+              <p:spPr>
+                <a:xfrm>
+                  <a:off x="-2346591" y="2651627"/>
+                  <a:ext cx="216000" cy="216000"/>
+                </a:xfrm>
+                <a:prstGeom prst="ellipse">
+                  <a:avLst/>
+                </a:prstGeom>
+                <a:solidFill>
+                  <a:schemeClr val="bg1"/>
+                </a:solidFill>
+                <a:ln>
+                  <a:noFill/>
+                </a:ln>
+              </p:spPr>
+              <p:style>
+                <a:lnRef idx="2">
+                  <a:schemeClr val="accent1">
+                    <a:shade val="50000"/>
+                  </a:schemeClr>
+                </a:lnRef>
+                <a:fillRef idx="1">
+                  <a:schemeClr val="accent1"/>
+                </a:fillRef>
+                <a:effectRef idx="0">
+                  <a:schemeClr val="accent1"/>
+                </a:effectRef>
+                <a:fontRef idx="minor">
+                  <a:schemeClr val="lt1"/>
+                </a:fontRef>
+              </p:style>
+              <p:txBody>
+                <a:bodyPr rtlCol="0" anchor="ctr"/>
+                <a:lstStyle/>
+                <a:p>
+                  <a:pPr algn="ctr"/>
+                  <a:endParaRPr lang="zh-TW" altLang="en-US"/>
+                </a:p>
+              </p:txBody>
+            </p:sp>
+            <p:sp>
+              <p:nvSpPr>
+                <p:cNvPr id="401" name="橢圓 400"/>
+                <p:cNvSpPr>
+                  <a:spLocks noChangeAspect="1"/>
+                </p:cNvSpPr>
+                <p:nvPr/>
+              </p:nvSpPr>
+              <p:spPr>
+                <a:xfrm>
+                  <a:off x="-2257116" y="1447116"/>
+                  <a:ext cx="396000" cy="396000"/>
+                </a:xfrm>
+                <a:prstGeom prst="ellipse">
+                  <a:avLst/>
+                </a:prstGeom>
+                <a:solidFill>
+                  <a:srgbClr val="FF00A8"/>
+                </a:solidFill>
+                <a:ln>
+                  <a:noFill/>
+                </a:ln>
+              </p:spPr>
+              <p:style>
+                <a:lnRef idx="2">
+                  <a:schemeClr val="accent1">
+                    <a:shade val="50000"/>
+                  </a:schemeClr>
+                </a:lnRef>
+                <a:fillRef idx="1">
+                  <a:schemeClr val="accent1"/>
+                </a:fillRef>
+                <a:effectRef idx="0">
+                  <a:schemeClr val="accent1"/>
+                </a:effectRef>
+                <a:fontRef idx="minor">
+                  <a:schemeClr val="lt1"/>
+                </a:fontRef>
+              </p:style>
+              <p:txBody>
+                <a:bodyPr rtlCol="0" anchor="ctr"/>
+                <a:lstStyle/>
+                <a:p>
+                  <a:pPr algn="ctr"/>
+                  <a:endParaRPr lang="zh-TW" altLang="en-US"/>
+                </a:p>
+              </p:txBody>
+            </p:sp>
+            <p:sp>
+              <p:nvSpPr>
+                <p:cNvPr id="402" name="橢圓 401"/>
+                <p:cNvSpPr>
+                  <a:spLocks noChangeAspect="1"/>
+                </p:cNvSpPr>
+                <p:nvPr/>
+              </p:nvSpPr>
+              <p:spPr>
+                <a:xfrm>
+                  <a:off x="-1999578" y="1168294"/>
+                  <a:ext cx="360000" cy="360000"/>
+                </a:xfrm>
+                <a:prstGeom prst="ellipse">
+                  <a:avLst/>
+                </a:prstGeom>
+                <a:solidFill>
+                  <a:srgbClr val="FF00E7"/>
+                </a:solidFill>
+                <a:ln>
+                  <a:noFill/>
+                </a:ln>
+              </p:spPr>
+              <p:style>
+                <a:lnRef idx="2">
+                  <a:schemeClr val="accent1">
+                    <a:shade val="50000"/>
+                  </a:schemeClr>
+                </a:lnRef>
+                <a:fillRef idx="1">
+                  <a:schemeClr val="accent1"/>
+                </a:fillRef>
+                <a:effectRef idx="0">
+                  <a:schemeClr val="accent1"/>
+                </a:effectRef>
+                <a:fontRef idx="minor">
+                  <a:schemeClr val="lt1"/>
+                </a:fontRef>
+              </p:style>
+              <p:txBody>
+                <a:bodyPr rtlCol="0" anchor="ctr"/>
+                <a:lstStyle/>
+                <a:p>
+                  <a:pPr algn="ctr"/>
+                  <a:endParaRPr lang="zh-TW" altLang="en-US"/>
+                </a:p>
+              </p:txBody>
+            </p:sp>
+            <p:sp>
+              <p:nvSpPr>
+                <p:cNvPr id="403" name="橢圓 402"/>
+                <p:cNvSpPr>
+                  <a:spLocks noChangeAspect="1"/>
+                </p:cNvSpPr>
+                <p:nvPr/>
+              </p:nvSpPr>
+              <p:spPr>
+                <a:xfrm>
+                  <a:off x="-1629286" y="983936"/>
+                  <a:ext cx="324000" cy="324000"/>
+                </a:xfrm>
+                <a:prstGeom prst="ellipse">
+                  <a:avLst/>
+                </a:prstGeom>
+                <a:solidFill>
+                  <a:srgbClr val="ED00FF"/>
+                </a:solidFill>
+                <a:ln>
+                  <a:noFill/>
+                </a:ln>
+              </p:spPr>
+              <p:style>
+                <a:lnRef idx="2">
+                  <a:schemeClr val="accent1">
+                    <a:shade val="50000"/>
+                  </a:schemeClr>
+                </a:lnRef>
+                <a:fillRef idx="1">
+                  <a:schemeClr val="accent1"/>
+                </a:fillRef>
+                <a:effectRef idx="0">
+                  <a:schemeClr val="accent1"/>
+                </a:effectRef>
+                <a:fontRef idx="minor">
+                  <a:schemeClr val="lt1"/>
+                </a:fontRef>
+              </p:style>
+              <p:txBody>
+                <a:bodyPr rtlCol="0" anchor="ctr"/>
+                <a:lstStyle/>
+                <a:p>
+                  <a:pPr algn="ctr"/>
+                  <a:endParaRPr lang="zh-TW" altLang="en-US"/>
+                </a:p>
+              </p:txBody>
+            </p:sp>
+            <p:sp>
+              <p:nvSpPr>
+                <p:cNvPr id="404" name="橢圓 403"/>
+                <p:cNvSpPr>
+                  <a:spLocks noChangeAspect="1"/>
+                </p:cNvSpPr>
+                <p:nvPr/>
+              </p:nvSpPr>
+              <p:spPr>
+                <a:xfrm>
+                  <a:off x="-1229161" y="1044377"/>
+                  <a:ext cx="288000" cy="288000"/>
+                </a:xfrm>
+                <a:prstGeom prst="ellipse">
+                  <a:avLst/>
+                </a:prstGeom>
+                <a:solidFill>
+                  <a:srgbClr val="D100FF"/>
+                </a:solidFill>
+                <a:ln>
+                  <a:noFill/>
+                </a:ln>
+              </p:spPr>
+              <p:style>
+                <a:lnRef idx="2">
+                  <a:schemeClr val="accent1">
+                    <a:shade val="50000"/>
+                  </a:schemeClr>
+                </a:lnRef>
+                <a:fillRef idx="1">
+                  <a:schemeClr val="accent1"/>
+                </a:fillRef>
+                <a:effectRef idx="0">
+                  <a:schemeClr val="accent1"/>
+                </a:effectRef>
+                <a:fontRef idx="minor">
+                  <a:schemeClr val="lt1"/>
+                </a:fontRef>
+              </p:style>
+              <p:txBody>
+                <a:bodyPr rtlCol="0" anchor="ctr"/>
+                <a:lstStyle/>
+                <a:p>
+                  <a:pPr algn="ctr"/>
+                  <a:endParaRPr lang="zh-TW" altLang="en-US"/>
+                </a:p>
+              </p:txBody>
+            </p:sp>
+            <p:sp>
+              <p:nvSpPr>
+                <p:cNvPr id="405" name="橢圓 404"/>
+                <p:cNvSpPr>
+                  <a:spLocks noChangeAspect="1"/>
+                </p:cNvSpPr>
+                <p:nvPr/>
+              </p:nvSpPr>
+              <p:spPr>
+                <a:xfrm>
+                  <a:off x="-907671" y="1303853"/>
+                  <a:ext cx="252000" cy="252000"/>
+                </a:xfrm>
+                <a:prstGeom prst="ellipse">
+                  <a:avLst/>
+                </a:prstGeom>
+                <a:solidFill>
+                  <a:srgbClr val="A700FF"/>
+                </a:solidFill>
+                <a:ln>
+                  <a:noFill/>
+                </a:ln>
+              </p:spPr>
+              <p:style>
+                <a:lnRef idx="2">
+                  <a:schemeClr val="accent1">
+                    <a:shade val="50000"/>
+                  </a:schemeClr>
+                </a:lnRef>
+                <a:fillRef idx="1">
+                  <a:schemeClr val="accent1"/>
+                </a:fillRef>
+                <a:effectRef idx="0">
+                  <a:schemeClr val="accent1"/>
+                </a:effectRef>
+                <a:fontRef idx="minor">
+                  <a:schemeClr val="lt1"/>
+                </a:fontRef>
+              </p:style>
+              <p:txBody>
+                <a:bodyPr rtlCol="0" anchor="ctr"/>
+                <a:lstStyle/>
+                <a:p>
+                  <a:pPr algn="ctr"/>
+                  <a:endParaRPr lang="zh-TW" altLang="en-US"/>
+                </a:p>
+              </p:txBody>
+            </p:sp>
+            <p:sp>
+              <p:nvSpPr>
+                <p:cNvPr id="406" name="橢圓 405"/>
+                <p:cNvSpPr>
+                  <a:spLocks noChangeAspect="1"/>
+                </p:cNvSpPr>
+                <p:nvPr/>
+              </p:nvSpPr>
+              <p:spPr>
+                <a:xfrm>
+                  <a:off x="-700874" y="1546983"/>
+                  <a:ext cx="216000" cy="216000"/>
+                </a:xfrm>
+                <a:prstGeom prst="ellipse">
+                  <a:avLst/>
+                </a:prstGeom>
+                <a:solidFill>
+                  <a:srgbClr val="5D00FF"/>
+                </a:solidFill>
+                <a:ln>
+                  <a:noFill/>
+                </a:ln>
+              </p:spPr>
+              <p:style>
+                <a:lnRef idx="2">
+                  <a:schemeClr val="accent1">
+                    <a:shade val="50000"/>
+                  </a:schemeClr>
+                </a:lnRef>
+                <a:fillRef idx="1">
+                  <a:schemeClr val="accent1"/>
+                </a:fillRef>
+                <a:effectRef idx="0">
+                  <a:schemeClr val="accent1"/>
+                </a:effectRef>
+                <a:fontRef idx="minor">
+                  <a:schemeClr val="lt1"/>
+                </a:fontRef>
+              </p:style>
+              <p:txBody>
+                <a:bodyPr rtlCol="0" anchor="ctr"/>
+                <a:lstStyle/>
+                <a:p>
+                  <a:pPr algn="ctr"/>
+                  <a:endParaRPr lang="zh-TW" altLang="en-US"/>
+                </a:p>
+              </p:txBody>
+            </p:sp>
+            <p:sp>
+              <p:nvSpPr>
+                <p:cNvPr id="407" name="橢圓 406"/>
+                <p:cNvSpPr>
+                  <a:spLocks noChangeAspect="1"/>
+                </p:cNvSpPr>
+                <p:nvPr/>
+              </p:nvSpPr>
+              <p:spPr>
+                <a:xfrm>
+                  <a:off x="-557313" y="1794773"/>
+                  <a:ext cx="180000" cy="180000"/>
+                </a:xfrm>
+                <a:prstGeom prst="ellipse">
+                  <a:avLst/>
+                </a:prstGeom>
+                <a:solidFill>
+                  <a:srgbClr val="1B00FF"/>
+                </a:solidFill>
+                <a:ln>
+                  <a:noFill/>
+                </a:ln>
+              </p:spPr>
+              <p:style>
+                <a:lnRef idx="2">
+                  <a:schemeClr val="accent1">
+                    <a:shade val="50000"/>
+                  </a:schemeClr>
+                </a:lnRef>
+                <a:fillRef idx="1">
+                  <a:schemeClr val="accent1"/>
+                </a:fillRef>
+                <a:effectRef idx="0">
+                  <a:schemeClr val="accent1"/>
+                </a:effectRef>
+                <a:fontRef idx="minor">
+                  <a:schemeClr val="lt1"/>
+                </a:fontRef>
+              </p:style>
+              <p:txBody>
+                <a:bodyPr rtlCol="0" anchor="ctr"/>
+                <a:lstStyle/>
+                <a:p>
+                  <a:pPr algn="ctr"/>
+                  <a:endParaRPr lang="zh-TW" altLang="en-US"/>
+                </a:p>
+              </p:txBody>
+            </p:sp>
+            <p:sp>
+              <p:nvSpPr>
+                <p:cNvPr id="408" name="橢圓 407"/>
+                <p:cNvSpPr>
+                  <a:spLocks noChangeAspect="1"/>
+                </p:cNvSpPr>
+                <p:nvPr/>
+              </p:nvSpPr>
+              <p:spPr>
+                <a:xfrm>
+                  <a:off x="-2491616" y="1775282"/>
+                  <a:ext cx="414000" cy="414000"/>
+                </a:xfrm>
+                <a:prstGeom prst="ellipse">
+                  <a:avLst/>
+                </a:prstGeom>
+                <a:solidFill>
+                  <a:srgbClr val="FF0069"/>
+                </a:solidFill>
+                <a:ln>
+                  <a:noFill/>
+                </a:ln>
+              </p:spPr>
+              <p:style>
+                <a:lnRef idx="2">
+                  <a:schemeClr val="accent1">
+                    <a:shade val="50000"/>
+                  </a:schemeClr>
+                </a:lnRef>
+                <a:fillRef idx="1">
+                  <a:schemeClr val="accent1"/>
+                </a:fillRef>
+                <a:effectRef idx="0">
+                  <a:schemeClr val="accent1"/>
+                </a:effectRef>
+                <a:fontRef idx="minor">
+                  <a:schemeClr val="lt1"/>
+                </a:fontRef>
+              </p:style>
+              <p:txBody>
+                <a:bodyPr rtlCol="0" anchor="ctr"/>
+                <a:lstStyle/>
+                <a:p>
+                  <a:pPr algn="ctr"/>
+                  <a:endParaRPr lang="zh-TW" altLang="en-US"/>
+                </a:p>
+              </p:txBody>
+            </p:sp>
+            <p:sp>
+              <p:nvSpPr>
+                <p:cNvPr id="409" name="橢圓 408"/>
+                <p:cNvSpPr>
+                  <a:spLocks noChangeAspect="1"/>
+                </p:cNvSpPr>
+                <p:nvPr/>
+              </p:nvSpPr>
+              <p:spPr>
+                <a:xfrm>
+                  <a:off x="-493420" y="2219093"/>
+                  <a:ext cx="144000" cy="144000"/>
+                </a:xfrm>
+                <a:prstGeom prst="ellipse">
+                  <a:avLst/>
+                </a:prstGeom>
+                <a:solidFill>
+                  <a:srgbClr val="00FFFE"/>
+                </a:solidFill>
+                <a:ln>
+                  <a:noFill/>
+                </a:ln>
+              </p:spPr>
+              <p:style>
+                <a:lnRef idx="2">
+                  <a:schemeClr val="accent1">
+                    <a:shade val="50000"/>
+                  </a:schemeClr>
+                </a:lnRef>
+                <a:fillRef idx="1">
+                  <a:schemeClr val="accent1"/>
+                </a:fillRef>
+                <a:effectRef idx="0">
+                  <a:schemeClr val="accent1"/>
+                </a:effectRef>
+                <a:fontRef idx="minor">
+                  <a:schemeClr val="lt1"/>
+                </a:fontRef>
+              </p:style>
+              <p:txBody>
+                <a:bodyPr rtlCol="0" anchor="ctr"/>
+                <a:lstStyle/>
+                <a:p>
+                  <a:pPr algn="ctr"/>
+                  <a:endParaRPr lang="zh-TW" altLang="en-US"/>
+                </a:p>
+              </p:txBody>
+            </p:sp>
+            <p:sp>
+              <p:nvSpPr>
+                <p:cNvPr id="410" name="橢圓 409"/>
+                <p:cNvSpPr>
+                  <a:spLocks noChangeAspect="1"/>
+                </p:cNvSpPr>
+                <p:nvPr/>
+              </p:nvSpPr>
+              <p:spPr>
+                <a:xfrm>
+                  <a:off x="-2476729" y="2503628"/>
+                  <a:ext cx="144000" cy="144000"/>
+                </a:xfrm>
+                <a:prstGeom prst="ellipse">
+                  <a:avLst/>
+                </a:prstGeom>
+                <a:solidFill>
+                  <a:schemeClr val="bg1"/>
+                </a:solidFill>
+                <a:ln>
+                  <a:noFill/>
+                </a:ln>
+              </p:spPr>
+              <p:style>
+                <a:lnRef idx="2">
+                  <a:schemeClr val="accent1">
+                    <a:shade val="50000"/>
+                  </a:schemeClr>
+                </a:lnRef>
+                <a:fillRef idx="1">
+                  <a:schemeClr val="accent1"/>
+                </a:fillRef>
+                <a:effectRef idx="0">
+                  <a:schemeClr val="accent1"/>
+                </a:effectRef>
+                <a:fontRef idx="minor">
+                  <a:schemeClr val="lt1"/>
+                </a:fontRef>
+              </p:style>
+              <p:txBody>
+                <a:bodyPr rtlCol="0" anchor="ctr"/>
+                <a:lstStyle/>
+                <a:p>
+                  <a:pPr algn="ctr"/>
+                  <a:endParaRPr lang="zh-TW" altLang="en-US"/>
+                </a:p>
+              </p:txBody>
+            </p:sp>
+            <p:sp>
+              <p:nvSpPr>
+                <p:cNvPr id="411" name="橢圓 410"/>
+                <p:cNvSpPr>
+                  <a:spLocks noChangeAspect="1"/>
+                </p:cNvSpPr>
+                <p:nvPr/>
+              </p:nvSpPr>
+              <p:spPr>
+                <a:xfrm flipV="1">
+                  <a:off x="-549480" y="2388181"/>
+                  <a:ext cx="180000" cy="180000"/>
+                </a:xfrm>
+                <a:prstGeom prst="ellipse">
+                  <a:avLst/>
+                </a:prstGeom>
+                <a:solidFill>
+                  <a:schemeClr val="bg1"/>
+                </a:solidFill>
+                <a:ln>
+                  <a:noFill/>
+                </a:ln>
+              </p:spPr>
+              <p:style>
+                <a:lnRef idx="2">
+                  <a:schemeClr val="accent1">
+                    <a:shade val="50000"/>
+                  </a:schemeClr>
+                </a:lnRef>
+                <a:fillRef idx="1">
+                  <a:schemeClr val="accent1"/>
+                </a:fillRef>
+                <a:effectRef idx="0">
+                  <a:schemeClr val="accent1"/>
+                </a:effectRef>
+                <a:fontRef idx="minor">
+                  <a:schemeClr val="lt1"/>
+                </a:fontRef>
+              </p:style>
+              <p:txBody>
+                <a:bodyPr rtlCol="0" anchor="ctr"/>
+                <a:lstStyle/>
+                <a:p>
+                  <a:pPr algn="ctr"/>
+                  <a:endParaRPr lang="zh-TW" altLang="en-US" u="sng"/>
+                </a:p>
+              </p:txBody>
+            </p:sp>
+            <p:sp>
+              <p:nvSpPr>
+                <p:cNvPr id="412" name="橢圓 411"/>
+                <p:cNvSpPr>
+                  <a:spLocks noChangeAspect="1"/>
+                </p:cNvSpPr>
+                <p:nvPr/>
+              </p:nvSpPr>
+              <p:spPr>
+                <a:xfrm>
+                  <a:off x="-513496" y="2015614"/>
+                  <a:ext cx="162000" cy="162000"/>
+                </a:xfrm>
+                <a:prstGeom prst="ellipse">
+                  <a:avLst/>
+                </a:prstGeom>
+                <a:solidFill>
+                  <a:srgbClr val="0033CC"/>
+                </a:solidFill>
+                <a:ln>
+                  <a:noFill/>
+                </a:ln>
+              </p:spPr>
+              <p:style>
+                <a:lnRef idx="2">
+                  <a:schemeClr val="accent1">
+                    <a:shade val="50000"/>
+                  </a:schemeClr>
+                </a:lnRef>
+                <a:fillRef idx="1">
+                  <a:schemeClr val="accent1"/>
+                </a:fillRef>
+                <a:effectRef idx="0">
+                  <a:schemeClr val="accent1"/>
+                </a:effectRef>
+                <a:fontRef idx="minor">
+                  <a:schemeClr val="lt1"/>
+                </a:fontRef>
+              </p:style>
+              <p:txBody>
+                <a:bodyPr rtlCol="0" anchor="ctr"/>
+                <a:lstStyle/>
+                <a:p>
+                  <a:pPr algn="ctr"/>
+                  <a:endParaRPr lang="zh-TW" altLang="en-US"/>
+                </a:p>
+              </p:txBody>
+            </p:sp>
+          </p:grpSp>
         </p:grpSp>
-        <p:cxnSp>
-          <p:nvCxnSpPr>
-            <p:cNvPr id="170" name="直線接點 169"/>
-            <p:cNvCxnSpPr/>
-            <p:nvPr/>
-          </p:nvCxnSpPr>
-          <p:spPr>
-            <a:xfrm>
-              <a:off x="7411393" y="528721"/>
-              <a:ext cx="0" cy="1388111"/>
-            </a:xfrm>
-            <a:prstGeom prst="line">
-              <a:avLst/>
-            </a:prstGeom>
-            <a:ln w="254000">
-              <a:solidFill>
-                <a:schemeClr val="bg1"/>
-              </a:solidFill>
-            </a:ln>
-          </p:spPr>
-          <p:style>
-            <a:lnRef idx="1">
-              <a:schemeClr val="accent1"/>
-            </a:lnRef>
-            <a:fillRef idx="0">
-              <a:schemeClr val="accent1"/>
-            </a:fillRef>
-            <a:effectRef idx="0">
-              <a:schemeClr val="accent1"/>
-            </a:effectRef>
-            <a:fontRef idx="minor">
-              <a:schemeClr val="tx1"/>
-            </a:fontRef>
-          </p:style>
-        </p:cxnSp>
-        <p:cxnSp>
-          <p:nvCxnSpPr>
-            <p:cNvPr id="210" name="直線接點 209"/>
-            <p:cNvCxnSpPr/>
-            <p:nvPr/>
-          </p:nvCxnSpPr>
-          <p:spPr>
-            <a:xfrm rot="5400000">
-              <a:off x="6842717" y="-55403"/>
-              <a:ext cx="0" cy="1388111"/>
-            </a:xfrm>
-            <a:prstGeom prst="line">
-              <a:avLst/>
-            </a:prstGeom>
-            <a:ln w="254000">
-              <a:solidFill>
-                <a:schemeClr val="bg1"/>
-              </a:solidFill>
-            </a:ln>
-          </p:spPr>
-          <p:style>
-            <a:lnRef idx="1">
-              <a:schemeClr val="accent1"/>
-            </a:lnRef>
-            <a:fillRef idx="0">
-              <a:schemeClr val="accent1"/>
-            </a:fillRef>
-            <a:effectRef idx="0">
-              <a:schemeClr val="accent1"/>
-            </a:effectRef>
-            <a:fontRef idx="minor">
-              <a:schemeClr val="tx1"/>
-            </a:fontRef>
-          </p:style>
-        </p:cxnSp>
-        <p:cxnSp>
-          <p:nvCxnSpPr>
-            <p:cNvPr id="211" name="直線接點 210"/>
-            <p:cNvCxnSpPr/>
-            <p:nvPr/>
-          </p:nvCxnSpPr>
-          <p:spPr>
-            <a:xfrm rot="10800000">
-              <a:off x="2871714" y="3482637"/>
-              <a:ext cx="0" cy="1388111"/>
-            </a:xfrm>
-            <a:prstGeom prst="line">
-              <a:avLst/>
-            </a:prstGeom>
-            <a:ln w="254000">
-              <a:solidFill>
-                <a:schemeClr val="bg1"/>
-              </a:solidFill>
-            </a:ln>
-          </p:spPr>
-          <p:style>
-            <a:lnRef idx="1">
-              <a:schemeClr val="accent1"/>
-            </a:lnRef>
-            <a:fillRef idx="0">
-              <a:schemeClr val="accent1"/>
-            </a:fillRef>
-            <a:effectRef idx="0">
-              <a:schemeClr val="accent1"/>
-            </a:effectRef>
-            <a:fontRef idx="minor">
-              <a:schemeClr val="tx1"/>
-            </a:fontRef>
-          </p:style>
-        </p:cxnSp>
-        <p:cxnSp>
-          <p:nvCxnSpPr>
-            <p:cNvPr id="212" name="直線接點 211"/>
-            <p:cNvCxnSpPr/>
-            <p:nvPr/>
-          </p:nvCxnSpPr>
-          <p:spPr>
-            <a:xfrm rot="16200000">
-              <a:off x="3434654" y="4050339"/>
-              <a:ext cx="0" cy="1388111"/>
-            </a:xfrm>
-            <a:prstGeom prst="line">
-              <a:avLst/>
-            </a:prstGeom>
-            <a:ln w="254000">
-              <a:solidFill>
-                <a:schemeClr val="bg1"/>
-              </a:solidFill>
-            </a:ln>
-          </p:spPr>
-          <p:style>
-            <a:lnRef idx="1">
-              <a:schemeClr val="accent1"/>
-            </a:lnRef>
-            <a:fillRef idx="0">
-              <a:schemeClr val="accent1"/>
-            </a:fillRef>
-            <a:effectRef idx="0">
-              <a:schemeClr val="accent1"/>
-            </a:effectRef>
-            <a:fontRef idx="minor">
-              <a:schemeClr val="tx1"/>
-            </a:fontRef>
-          </p:style>
-        </p:cxnSp>
-        <p:cxnSp>
-          <p:nvCxnSpPr>
-            <p:cNvPr id="214" name="直線接點 213"/>
-            <p:cNvCxnSpPr/>
-            <p:nvPr/>
-          </p:nvCxnSpPr>
-          <p:spPr>
-            <a:xfrm rot="16200000">
-              <a:off x="3438575" y="-54692"/>
-              <a:ext cx="0" cy="1388111"/>
-            </a:xfrm>
-            <a:prstGeom prst="line">
-              <a:avLst/>
-            </a:prstGeom>
-            <a:ln w="254000">
-              <a:solidFill>
-                <a:schemeClr val="bg1"/>
-              </a:solidFill>
-            </a:ln>
-          </p:spPr>
-          <p:style>
-            <a:lnRef idx="1">
-              <a:schemeClr val="accent1"/>
-            </a:lnRef>
-            <a:fillRef idx="0">
-              <a:schemeClr val="accent1"/>
-            </a:fillRef>
-            <a:effectRef idx="0">
-              <a:schemeClr val="accent1"/>
-            </a:effectRef>
-            <a:fontRef idx="minor">
-              <a:schemeClr val="tx1"/>
-            </a:fontRef>
-          </p:style>
-        </p:cxnSp>
-        <p:cxnSp>
-          <p:nvCxnSpPr>
-            <p:cNvPr id="216" name="直線接點 215"/>
-            <p:cNvCxnSpPr/>
-            <p:nvPr/>
-          </p:nvCxnSpPr>
-          <p:spPr>
-            <a:xfrm>
-              <a:off x="2871583" y="511996"/>
-              <a:ext cx="0" cy="1388111"/>
-            </a:xfrm>
-            <a:prstGeom prst="line">
-              <a:avLst/>
-            </a:prstGeom>
-            <a:ln w="254000">
-              <a:solidFill>
-                <a:schemeClr val="bg1"/>
-              </a:solidFill>
-            </a:ln>
-          </p:spPr>
-          <p:style>
-            <a:lnRef idx="1">
-              <a:schemeClr val="accent1"/>
-            </a:lnRef>
-            <a:fillRef idx="0">
-              <a:schemeClr val="accent1"/>
-            </a:fillRef>
-            <a:effectRef idx="0">
-              <a:schemeClr val="accent1"/>
-            </a:effectRef>
-            <a:fontRef idx="minor">
-              <a:schemeClr val="tx1"/>
-            </a:fontRef>
-          </p:style>
-        </p:cxnSp>
-        <p:cxnSp>
-          <p:nvCxnSpPr>
-            <p:cNvPr id="217" name="直線接點 216"/>
-            <p:cNvCxnSpPr/>
-            <p:nvPr/>
-          </p:nvCxnSpPr>
-          <p:spPr>
-            <a:xfrm rot="5400000">
-              <a:off x="6846737" y="4059965"/>
-              <a:ext cx="0" cy="1388111"/>
-            </a:xfrm>
-            <a:prstGeom prst="line">
-              <a:avLst/>
-            </a:prstGeom>
-            <a:ln w="254000">
-              <a:solidFill>
-                <a:schemeClr val="bg1"/>
-              </a:solidFill>
-            </a:ln>
-          </p:spPr>
-          <p:style>
-            <a:lnRef idx="1">
-              <a:schemeClr val="accent1"/>
-            </a:lnRef>
-            <a:fillRef idx="0">
-              <a:schemeClr val="accent1"/>
-            </a:fillRef>
-            <a:effectRef idx="0">
-              <a:schemeClr val="accent1"/>
-            </a:effectRef>
-            <a:fontRef idx="minor">
-              <a:schemeClr val="tx1"/>
-            </a:fontRef>
-          </p:style>
-        </p:cxnSp>
-        <p:cxnSp>
-          <p:nvCxnSpPr>
-            <p:cNvPr id="218" name="直線接點 217"/>
-            <p:cNvCxnSpPr/>
-            <p:nvPr/>
-          </p:nvCxnSpPr>
-          <p:spPr>
-            <a:xfrm rot="10800000">
-              <a:off x="7414901" y="3496375"/>
-              <a:ext cx="0" cy="1388111"/>
-            </a:xfrm>
-            <a:prstGeom prst="line">
-              <a:avLst/>
-            </a:prstGeom>
-            <a:ln w="254000">
-              <a:solidFill>
-                <a:schemeClr val="bg1"/>
-              </a:solidFill>
-            </a:ln>
-          </p:spPr>
-          <p:style>
-            <a:lnRef idx="1">
-              <a:schemeClr val="accent1"/>
-            </a:lnRef>
-            <a:fillRef idx="0">
-              <a:schemeClr val="accent1"/>
-            </a:fillRef>
-            <a:effectRef idx="0">
-              <a:schemeClr val="accent1"/>
-            </a:effectRef>
-            <a:fontRef idx="minor">
-              <a:schemeClr val="tx1"/>
-            </a:fontRef>
-          </p:style>
-        </p:cxnSp>
       </p:grpSp>
     </p:spTree>
     <p:extLst>

</xml_diff>